<commit_message>
Major Process Rewrite, some mfg.csv mods
</commit_message>
<xml_diff>
--- a/Instructions/Tableau Prep Builder for Compliance.pptx
+++ b/Instructions/Tableau Prep Builder for Compliance.pptx
@@ -6,8 +6,9 @@
   </p:sldMasterIdLst>
   <p:sldIdLst>
     <p:sldId id="256" r:id="rId2"/>
-    <p:sldId id="257" r:id="rId3"/>
-    <p:sldId id="258" r:id="rId4"/>
+    <p:sldId id="259" r:id="rId3"/>
+    <p:sldId id="257" r:id="rId4"/>
+    <p:sldId id="258" r:id="rId5"/>
   </p:sldIdLst>
   <p:sldSz cx="12192000" cy="6858000"/>
   <p:notesSz cx="6858000" cy="9144000"/>
@@ -106,6 +107,11 @@
       </a:defRPr>
     </a:lvl9pPr>
   </p:defaultTextStyle>
+  <p:extLst>
+    <p:ext uri="{EFAFB233-063F-42B5-8137-9DF3F51BA10A}">
+      <p15:sldGuideLst xmlns:p15="http://schemas.microsoft.com/office/powerpoint/2012/main"/>
+    </p:ext>
+  </p:extLst>
 </p:presentation>
 </file>
 
@@ -151,10 +157,9 @@
           </a:lstStyle>
           <a:p>
             <a:r>
-              <a:rPr lang="en-US" smtClean="0"/>
+              <a:rPr lang="en-US"/>
               <a:t>Click to edit Master title style</a:t>
             </a:r>
-            <a:endParaRPr lang="en-US"/>
           </a:p>
         </p:txBody>
       </p:sp>
@@ -216,10 +221,9 @@
           </a:lstStyle>
           <a:p>
             <a:r>
-              <a:rPr lang="en-US" smtClean="0"/>
+              <a:rPr lang="en-US"/>
               <a:t>Click to edit Master subtitle style</a:t>
             </a:r>
-            <a:endParaRPr lang="en-US"/>
           </a:p>
         </p:txBody>
       </p:sp>
@@ -240,7 +244,7 @@
           <a:p>
             <a:fld id="{0EA5AA3B-5F9F-4BBA-8961-440E20155CAE}" type="datetimeFigureOut">
               <a:rPr lang="en-US" smtClean="0"/>
-              <a:t>11/13/2020</a:t>
+              <a:t>12/1/2020</a:t>
             </a:fld>
             <a:endParaRPr lang="en-US"/>
           </a:p>
@@ -334,10 +338,9 @@
           <a:lstStyle/>
           <a:p>
             <a:r>
-              <a:rPr lang="en-US" smtClean="0"/>
+              <a:rPr lang="en-US"/>
               <a:t>Click to edit Master title style</a:t>
             </a:r>
-            <a:endParaRPr lang="en-US"/>
           </a:p>
         </p:txBody>
       </p:sp>
@@ -358,38 +361,37 @@
           <a:p>
             <a:pPr lvl="0"/>
             <a:r>
-              <a:rPr lang="en-US" smtClean="0"/>
+              <a:rPr lang="en-US"/>
               <a:t>Click to edit Master text styles</a:t>
             </a:r>
           </a:p>
           <a:p>
             <a:pPr lvl="1"/>
             <a:r>
-              <a:rPr lang="en-US" smtClean="0"/>
+              <a:rPr lang="en-US"/>
               <a:t>Second level</a:t>
             </a:r>
           </a:p>
           <a:p>
             <a:pPr lvl="2"/>
             <a:r>
-              <a:rPr lang="en-US" smtClean="0"/>
+              <a:rPr lang="en-US"/>
               <a:t>Third level</a:t>
             </a:r>
           </a:p>
           <a:p>
             <a:pPr lvl="3"/>
             <a:r>
-              <a:rPr lang="en-US" smtClean="0"/>
+              <a:rPr lang="en-US"/>
               <a:t>Fourth level</a:t>
             </a:r>
           </a:p>
           <a:p>
             <a:pPr lvl="4"/>
             <a:r>
-              <a:rPr lang="en-US" smtClean="0"/>
+              <a:rPr lang="en-US"/>
               <a:t>Fifth level</a:t>
             </a:r>
-            <a:endParaRPr lang="en-US"/>
           </a:p>
         </p:txBody>
       </p:sp>
@@ -410,7 +412,7 @@
           <a:p>
             <a:fld id="{0EA5AA3B-5F9F-4BBA-8961-440E20155CAE}" type="datetimeFigureOut">
               <a:rPr lang="en-US" smtClean="0"/>
-              <a:t>11/13/2020</a:t>
+              <a:t>12/1/2020</a:t>
             </a:fld>
             <a:endParaRPr lang="en-US"/>
           </a:p>
@@ -509,10 +511,9 @@
           <a:lstStyle/>
           <a:p>
             <a:r>
-              <a:rPr lang="en-US" smtClean="0"/>
+              <a:rPr lang="en-US"/>
               <a:t>Click to edit Master title style</a:t>
             </a:r>
-            <a:endParaRPr lang="en-US"/>
           </a:p>
         </p:txBody>
       </p:sp>
@@ -538,38 +539,37 @@
           <a:p>
             <a:pPr lvl="0"/>
             <a:r>
-              <a:rPr lang="en-US" smtClean="0"/>
+              <a:rPr lang="en-US"/>
               <a:t>Click to edit Master text styles</a:t>
             </a:r>
           </a:p>
           <a:p>
             <a:pPr lvl="1"/>
             <a:r>
-              <a:rPr lang="en-US" smtClean="0"/>
+              <a:rPr lang="en-US"/>
               <a:t>Second level</a:t>
             </a:r>
           </a:p>
           <a:p>
             <a:pPr lvl="2"/>
             <a:r>
-              <a:rPr lang="en-US" smtClean="0"/>
+              <a:rPr lang="en-US"/>
               <a:t>Third level</a:t>
             </a:r>
           </a:p>
           <a:p>
             <a:pPr lvl="3"/>
             <a:r>
-              <a:rPr lang="en-US" smtClean="0"/>
+              <a:rPr lang="en-US"/>
               <a:t>Fourth level</a:t>
             </a:r>
           </a:p>
           <a:p>
             <a:pPr lvl="4"/>
             <a:r>
-              <a:rPr lang="en-US" smtClean="0"/>
+              <a:rPr lang="en-US"/>
               <a:t>Fifth level</a:t>
             </a:r>
-            <a:endParaRPr lang="en-US"/>
           </a:p>
         </p:txBody>
       </p:sp>
@@ -590,7 +590,7 @@
           <a:p>
             <a:fld id="{0EA5AA3B-5F9F-4BBA-8961-440E20155CAE}" type="datetimeFigureOut">
               <a:rPr lang="en-US" smtClean="0"/>
-              <a:t>11/13/2020</a:t>
+              <a:t>12/1/2020</a:t>
             </a:fld>
             <a:endParaRPr lang="en-US"/>
           </a:p>
@@ -684,10 +684,9 @@
           <a:lstStyle/>
           <a:p>
             <a:r>
-              <a:rPr lang="en-US" smtClean="0"/>
+              <a:rPr lang="en-US"/>
               <a:t>Click to edit Master title style</a:t>
             </a:r>
-            <a:endParaRPr lang="en-US"/>
           </a:p>
         </p:txBody>
       </p:sp>
@@ -708,38 +707,37 @@
           <a:p>
             <a:pPr lvl="0"/>
             <a:r>
-              <a:rPr lang="en-US" smtClean="0"/>
+              <a:rPr lang="en-US"/>
               <a:t>Click to edit Master text styles</a:t>
             </a:r>
           </a:p>
           <a:p>
             <a:pPr lvl="1"/>
             <a:r>
-              <a:rPr lang="en-US" smtClean="0"/>
+              <a:rPr lang="en-US"/>
               <a:t>Second level</a:t>
             </a:r>
           </a:p>
           <a:p>
             <a:pPr lvl="2"/>
             <a:r>
-              <a:rPr lang="en-US" smtClean="0"/>
+              <a:rPr lang="en-US"/>
               <a:t>Third level</a:t>
             </a:r>
           </a:p>
           <a:p>
             <a:pPr lvl="3"/>
             <a:r>
-              <a:rPr lang="en-US" smtClean="0"/>
+              <a:rPr lang="en-US"/>
               <a:t>Fourth level</a:t>
             </a:r>
           </a:p>
           <a:p>
             <a:pPr lvl="4"/>
             <a:r>
-              <a:rPr lang="en-US" smtClean="0"/>
+              <a:rPr lang="en-US"/>
               <a:t>Fifth level</a:t>
             </a:r>
-            <a:endParaRPr lang="en-US"/>
           </a:p>
         </p:txBody>
       </p:sp>
@@ -760,7 +758,7 @@
           <a:p>
             <a:fld id="{0EA5AA3B-5F9F-4BBA-8961-440E20155CAE}" type="datetimeFigureOut">
               <a:rPr lang="en-US" smtClean="0"/>
-              <a:t>11/13/2020</a:t>
+              <a:t>12/1/2020</a:t>
             </a:fld>
             <a:endParaRPr lang="en-US"/>
           </a:p>
@@ -863,10 +861,9 @@
           </a:lstStyle>
           <a:p>
             <a:r>
-              <a:rPr lang="en-US" smtClean="0"/>
+              <a:rPr lang="en-US"/>
               <a:t>Click to edit Master title style</a:t>
             </a:r>
-            <a:endParaRPr lang="en-US"/>
           </a:p>
         </p:txBody>
       </p:sp>
@@ -983,7 +980,7 @@
           <a:p>
             <a:pPr lvl="0"/>
             <a:r>
-              <a:rPr lang="en-US" smtClean="0"/>
+              <a:rPr lang="en-US"/>
               <a:t>Click to edit Master text styles</a:t>
             </a:r>
           </a:p>
@@ -1006,7 +1003,7 @@
           <a:p>
             <a:fld id="{0EA5AA3B-5F9F-4BBA-8961-440E20155CAE}" type="datetimeFigureOut">
               <a:rPr lang="en-US" smtClean="0"/>
-              <a:t>11/13/2020</a:t>
+              <a:t>12/1/2020</a:t>
             </a:fld>
             <a:endParaRPr lang="en-US"/>
           </a:p>
@@ -1100,10 +1097,9 @@
           <a:lstStyle/>
           <a:p>
             <a:r>
-              <a:rPr lang="en-US" smtClean="0"/>
+              <a:rPr lang="en-US"/>
               <a:t>Click to edit Master title style</a:t>
             </a:r>
-            <a:endParaRPr lang="en-US"/>
           </a:p>
         </p:txBody>
       </p:sp>
@@ -1129,38 +1125,37 @@
           <a:p>
             <a:pPr lvl="0"/>
             <a:r>
-              <a:rPr lang="en-US" smtClean="0"/>
+              <a:rPr lang="en-US"/>
               <a:t>Click to edit Master text styles</a:t>
             </a:r>
           </a:p>
           <a:p>
             <a:pPr lvl="1"/>
             <a:r>
-              <a:rPr lang="en-US" smtClean="0"/>
+              <a:rPr lang="en-US"/>
               <a:t>Second level</a:t>
             </a:r>
           </a:p>
           <a:p>
             <a:pPr lvl="2"/>
             <a:r>
-              <a:rPr lang="en-US" smtClean="0"/>
+              <a:rPr lang="en-US"/>
               <a:t>Third level</a:t>
             </a:r>
           </a:p>
           <a:p>
             <a:pPr lvl="3"/>
             <a:r>
-              <a:rPr lang="en-US" smtClean="0"/>
+              <a:rPr lang="en-US"/>
               <a:t>Fourth level</a:t>
             </a:r>
           </a:p>
           <a:p>
             <a:pPr lvl="4"/>
             <a:r>
-              <a:rPr lang="en-US" smtClean="0"/>
+              <a:rPr lang="en-US"/>
               <a:t>Fifth level</a:t>
             </a:r>
-            <a:endParaRPr lang="en-US"/>
           </a:p>
         </p:txBody>
       </p:sp>
@@ -1186,38 +1181,37 @@
           <a:p>
             <a:pPr lvl="0"/>
             <a:r>
-              <a:rPr lang="en-US" smtClean="0"/>
+              <a:rPr lang="en-US"/>
               <a:t>Click to edit Master text styles</a:t>
             </a:r>
           </a:p>
           <a:p>
             <a:pPr lvl="1"/>
             <a:r>
-              <a:rPr lang="en-US" smtClean="0"/>
+              <a:rPr lang="en-US"/>
               <a:t>Second level</a:t>
             </a:r>
           </a:p>
           <a:p>
             <a:pPr lvl="2"/>
             <a:r>
-              <a:rPr lang="en-US" smtClean="0"/>
+              <a:rPr lang="en-US"/>
               <a:t>Third level</a:t>
             </a:r>
           </a:p>
           <a:p>
             <a:pPr lvl="3"/>
             <a:r>
-              <a:rPr lang="en-US" smtClean="0"/>
+              <a:rPr lang="en-US"/>
               <a:t>Fourth level</a:t>
             </a:r>
           </a:p>
           <a:p>
             <a:pPr lvl="4"/>
             <a:r>
-              <a:rPr lang="en-US" smtClean="0"/>
+              <a:rPr lang="en-US"/>
               <a:t>Fifth level</a:t>
             </a:r>
-            <a:endParaRPr lang="en-US"/>
           </a:p>
         </p:txBody>
       </p:sp>
@@ -1238,7 +1232,7 @@
           <a:p>
             <a:fld id="{0EA5AA3B-5F9F-4BBA-8961-440E20155CAE}" type="datetimeFigureOut">
               <a:rPr lang="en-US" smtClean="0"/>
-              <a:t>11/13/2020</a:t>
+              <a:t>12/1/2020</a:t>
             </a:fld>
             <a:endParaRPr lang="en-US"/>
           </a:p>
@@ -1337,10 +1331,9 @@
           <a:lstStyle/>
           <a:p>
             <a:r>
-              <a:rPr lang="en-US" smtClean="0"/>
+              <a:rPr lang="en-US"/>
               <a:t>Click to edit Master title style</a:t>
             </a:r>
-            <a:endParaRPr lang="en-US"/>
           </a:p>
         </p:txBody>
       </p:sp>
@@ -1403,7 +1396,7 @@
           <a:p>
             <a:pPr lvl="0"/>
             <a:r>
-              <a:rPr lang="en-US" smtClean="0"/>
+              <a:rPr lang="en-US"/>
               <a:t>Click to edit Master text styles</a:t>
             </a:r>
           </a:p>
@@ -1431,38 +1424,37 @@
           <a:p>
             <a:pPr lvl="0"/>
             <a:r>
-              <a:rPr lang="en-US" smtClean="0"/>
+              <a:rPr lang="en-US"/>
               <a:t>Click to edit Master text styles</a:t>
             </a:r>
           </a:p>
           <a:p>
             <a:pPr lvl="1"/>
             <a:r>
-              <a:rPr lang="en-US" smtClean="0"/>
+              <a:rPr lang="en-US"/>
               <a:t>Second level</a:t>
             </a:r>
           </a:p>
           <a:p>
             <a:pPr lvl="2"/>
             <a:r>
-              <a:rPr lang="en-US" smtClean="0"/>
+              <a:rPr lang="en-US"/>
               <a:t>Third level</a:t>
             </a:r>
           </a:p>
           <a:p>
             <a:pPr lvl="3"/>
             <a:r>
-              <a:rPr lang="en-US" smtClean="0"/>
+              <a:rPr lang="en-US"/>
               <a:t>Fourth level</a:t>
             </a:r>
           </a:p>
           <a:p>
             <a:pPr lvl="4"/>
             <a:r>
-              <a:rPr lang="en-US" smtClean="0"/>
+              <a:rPr lang="en-US"/>
               <a:t>Fifth level</a:t>
             </a:r>
-            <a:endParaRPr lang="en-US"/>
           </a:p>
         </p:txBody>
       </p:sp>
@@ -1525,7 +1517,7 @@
           <a:p>
             <a:pPr lvl="0"/>
             <a:r>
-              <a:rPr lang="en-US" smtClean="0"/>
+              <a:rPr lang="en-US"/>
               <a:t>Click to edit Master text styles</a:t>
             </a:r>
           </a:p>
@@ -1553,38 +1545,37 @@
           <a:p>
             <a:pPr lvl="0"/>
             <a:r>
-              <a:rPr lang="en-US" smtClean="0"/>
+              <a:rPr lang="en-US"/>
               <a:t>Click to edit Master text styles</a:t>
             </a:r>
           </a:p>
           <a:p>
             <a:pPr lvl="1"/>
             <a:r>
-              <a:rPr lang="en-US" smtClean="0"/>
+              <a:rPr lang="en-US"/>
               <a:t>Second level</a:t>
             </a:r>
           </a:p>
           <a:p>
             <a:pPr lvl="2"/>
             <a:r>
-              <a:rPr lang="en-US" smtClean="0"/>
+              <a:rPr lang="en-US"/>
               <a:t>Third level</a:t>
             </a:r>
           </a:p>
           <a:p>
             <a:pPr lvl="3"/>
             <a:r>
-              <a:rPr lang="en-US" smtClean="0"/>
+              <a:rPr lang="en-US"/>
               <a:t>Fourth level</a:t>
             </a:r>
           </a:p>
           <a:p>
             <a:pPr lvl="4"/>
             <a:r>
-              <a:rPr lang="en-US" smtClean="0"/>
+              <a:rPr lang="en-US"/>
               <a:t>Fifth level</a:t>
             </a:r>
-            <a:endParaRPr lang="en-US"/>
           </a:p>
         </p:txBody>
       </p:sp>
@@ -1605,7 +1596,7 @@
           <a:p>
             <a:fld id="{0EA5AA3B-5F9F-4BBA-8961-440E20155CAE}" type="datetimeFigureOut">
               <a:rPr lang="en-US" smtClean="0"/>
-              <a:t>11/13/2020</a:t>
+              <a:t>12/1/2020</a:t>
             </a:fld>
             <a:endParaRPr lang="en-US"/>
           </a:p>
@@ -1699,10 +1690,9 @@
           <a:lstStyle/>
           <a:p>
             <a:r>
-              <a:rPr lang="en-US" smtClean="0"/>
+              <a:rPr lang="en-US"/>
               <a:t>Click to edit Master title style</a:t>
             </a:r>
-            <a:endParaRPr lang="en-US"/>
           </a:p>
         </p:txBody>
       </p:sp>
@@ -1723,7 +1713,7 @@
           <a:p>
             <a:fld id="{0EA5AA3B-5F9F-4BBA-8961-440E20155CAE}" type="datetimeFigureOut">
               <a:rPr lang="en-US" smtClean="0"/>
-              <a:t>11/13/2020</a:t>
+              <a:t>12/1/2020</a:t>
             </a:fld>
             <a:endParaRPr lang="en-US"/>
           </a:p>
@@ -1818,7 +1808,7 @@
           <a:p>
             <a:fld id="{0EA5AA3B-5F9F-4BBA-8961-440E20155CAE}" type="datetimeFigureOut">
               <a:rPr lang="en-US" smtClean="0"/>
-              <a:t>11/13/2020</a:t>
+              <a:t>12/1/2020</a:t>
             </a:fld>
             <a:endParaRPr lang="en-US"/>
           </a:p>
@@ -1921,10 +1911,9 @@
           </a:lstStyle>
           <a:p>
             <a:r>
-              <a:rPr lang="en-US" smtClean="0"/>
+              <a:rPr lang="en-US"/>
               <a:t>Click to edit Master title style</a:t>
             </a:r>
-            <a:endParaRPr lang="en-US"/>
           </a:p>
         </p:txBody>
       </p:sp>
@@ -1978,38 +1967,37 @@
           <a:p>
             <a:pPr lvl="0"/>
             <a:r>
-              <a:rPr lang="en-US" smtClean="0"/>
+              <a:rPr lang="en-US"/>
               <a:t>Click to edit Master text styles</a:t>
             </a:r>
           </a:p>
           <a:p>
             <a:pPr lvl="1"/>
             <a:r>
-              <a:rPr lang="en-US" smtClean="0"/>
+              <a:rPr lang="en-US"/>
               <a:t>Second level</a:t>
             </a:r>
           </a:p>
           <a:p>
             <a:pPr lvl="2"/>
             <a:r>
-              <a:rPr lang="en-US" smtClean="0"/>
+              <a:rPr lang="en-US"/>
               <a:t>Third level</a:t>
             </a:r>
           </a:p>
           <a:p>
             <a:pPr lvl="3"/>
             <a:r>
-              <a:rPr lang="en-US" smtClean="0"/>
+              <a:rPr lang="en-US"/>
               <a:t>Fourth level</a:t>
             </a:r>
           </a:p>
           <a:p>
             <a:pPr lvl="4"/>
             <a:r>
-              <a:rPr lang="en-US" smtClean="0"/>
+              <a:rPr lang="en-US"/>
               <a:t>Fifth level</a:t>
             </a:r>
-            <a:endParaRPr lang="en-US"/>
           </a:p>
         </p:txBody>
       </p:sp>
@@ -2072,7 +2060,7 @@
           <a:p>
             <a:pPr lvl="0"/>
             <a:r>
-              <a:rPr lang="en-US" smtClean="0"/>
+              <a:rPr lang="en-US"/>
               <a:t>Click to edit Master text styles</a:t>
             </a:r>
           </a:p>
@@ -2095,7 +2083,7 @@
           <a:p>
             <a:fld id="{0EA5AA3B-5F9F-4BBA-8961-440E20155CAE}" type="datetimeFigureOut">
               <a:rPr lang="en-US" smtClean="0"/>
-              <a:t>11/13/2020</a:t>
+              <a:t>12/1/2020</a:t>
             </a:fld>
             <a:endParaRPr lang="en-US"/>
           </a:p>
@@ -2198,10 +2186,9 @@
           </a:lstStyle>
           <a:p>
             <a:r>
-              <a:rPr lang="en-US" smtClean="0"/>
+              <a:rPr lang="en-US"/>
               <a:t>Click to edit Master title style</a:t>
             </a:r>
-            <a:endParaRPr lang="en-US"/>
           </a:p>
         </p:txBody>
       </p:sp>
@@ -2325,7 +2312,7 @@
           <a:p>
             <a:pPr lvl="0"/>
             <a:r>
-              <a:rPr lang="en-US" smtClean="0"/>
+              <a:rPr lang="en-US"/>
               <a:t>Click to edit Master text styles</a:t>
             </a:r>
           </a:p>
@@ -2348,7 +2335,7 @@
           <a:p>
             <a:fld id="{0EA5AA3B-5F9F-4BBA-8961-440E20155CAE}" type="datetimeFigureOut">
               <a:rPr lang="en-US" smtClean="0"/>
-              <a:t>11/13/2020</a:t>
+              <a:t>12/1/2020</a:t>
             </a:fld>
             <a:endParaRPr lang="en-US"/>
           </a:p>
@@ -2457,10 +2444,9 @@
           <a:lstStyle/>
           <a:p>
             <a:r>
-              <a:rPr lang="en-US" smtClean="0"/>
+              <a:rPr lang="en-US"/>
               <a:t>Click to edit Master title style</a:t>
             </a:r>
-            <a:endParaRPr lang="en-US"/>
           </a:p>
         </p:txBody>
       </p:sp>
@@ -2491,38 +2477,37 @@
           <a:p>
             <a:pPr lvl="0"/>
             <a:r>
-              <a:rPr lang="en-US" smtClean="0"/>
+              <a:rPr lang="en-US"/>
               <a:t>Click to edit Master text styles</a:t>
             </a:r>
           </a:p>
           <a:p>
             <a:pPr lvl="1"/>
             <a:r>
-              <a:rPr lang="en-US" smtClean="0"/>
+              <a:rPr lang="en-US"/>
               <a:t>Second level</a:t>
             </a:r>
           </a:p>
           <a:p>
             <a:pPr lvl="2"/>
             <a:r>
-              <a:rPr lang="en-US" smtClean="0"/>
+              <a:rPr lang="en-US"/>
               <a:t>Third level</a:t>
             </a:r>
           </a:p>
           <a:p>
             <a:pPr lvl="3"/>
             <a:r>
-              <a:rPr lang="en-US" smtClean="0"/>
+              <a:rPr lang="en-US"/>
               <a:t>Fourth level</a:t>
             </a:r>
           </a:p>
           <a:p>
             <a:pPr lvl="4"/>
             <a:r>
-              <a:rPr lang="en-US" smtClean="0"/>
+              <a:rPr lang="en-US"/>
               <a:t>Fifth level</a:t>
             </a:r>
-            <a:endParaRPr lang="en-US"/>
           </a:p>
         </p:txBody>
       </p:sp>
@@ -2561,7 +2546,7 @@
           <a:p>
             <a:fld id="{0EA5AA3B-5F9F-4BBA-8961-440E20155CAE}" type="datetimeFigureOut">
               <a:rPr lang="en-US" smtClean="0"/>
-              <a:t>11/13/2020</a:t>
+              <a:t>12/1/2020</a:t>
             </a:fld>
             <a:endParaRPr lang="en-US"/>
           </a:p>
@@ -2989,10 +2974,9 @@
           <a:lstStyle/>
           <a:p>
             <a:r>
-              <a:rPr lang="en-US" dirty="0" smtClean="0"/>
+              <a:rPr lang="en-US" dirty="0"/>
               <a:t>Tableau Prep Builder for Compliance</a:t>
             </a:r>
-            <a:endParaRPr lang="en-US" dirty="0"/>
           </a:p>
         </p:txBody>
       </p:sp>
@@ -3006,13 +2990,6 @@
   <p:clrMapOvr>
     <a:masterClrMapping/>
   </p:clrMapOvr>
-  <p:timing>
-    <p:tnLst>
-      <p:par>
-        <p:cTn id="1" dur="indefinite" restart="never" nodeType="tmRoot"/>
-      </p:par>
-    </p:tnLst>
-  </p:timing>
 </p:sld>
 </file>
 
@@ -3046,7 +3023,7 @@
         <p:spPr>
           <a:xfrm>
             <a:off x="609600" y="363411"/>
-            <a:ext cx="4800600" cy="935037"/>
+            <a:ext cx="10972800" cy="935037"/>
           </a:xfrm>
         </p:spPr>
         <p:txBody>
@@ -3056,672 +3033,21 @@
           <a:lstStyle/>
           <a:p>
             <a:r>
-              <a:rPr lang="en-US" dirty="0" smtClean="0">
-                <a:solidFill>
-                  <a:schemeClr val="accent1"/>
-                </a:solidFill>
-              </a:rPr>
-              <a:t>Data Sources</a:t>
-            </a:r>
-            <a:endParaRPr lang="en-US" dirty="0">
-              <a:solidFill>
-                <a:schemeClr val="accent1"/>
-              </a:solidFill>
-            </a:endParaRPr>
-          </a:p>
-        </p:txBody>
-      </p:sp>
-      <p:sp>
-        <p:nvSpPr>
-          <p:cNvPr id="6" name="Flowchart: Magnetic Disk 5"/>
-          <p:cNvSpPr/>
-          <p:nvPr/>
-        </p:nvSpPr>
-        <p:spPr>
-          <a:xfrm>
-            <a:off x="1295972" y="1554480"/>
-            <a:ext cx="2056828" cy="699322"/>
-          </a:xfrm>
-          <a:prstGeom prst="flowChartMagneticDisk">
-            <a:avLst/>
-          </a:prstGeom>
-          <a:ln w="28575"/>
-        </p:spPr>
-        <p:style>
-          <a:lnRef idx="2">
-            <a:schemeClr val="accent1">
-              <a:shade val="50000"/>
-            </a:schemeClr>
-          </a:lnRef>
-          <a:fillRef idx="1">
-            <a:schemeClr val="accent1"/>
-          </a:fillRef>
-          <a:effectRef idx="0">
-            <a:schemeClr val="accent1"/>
-          </a:effectRef>
-          <a:fontRef idx="minor">
-            <a:schemeClr val="lt1"/>
-          </a:fontRef>
-        </p:style>
-        <p:txBody>
-          <a:bodyPr rtlCol="0" anchor="ctr"/>
-          <a:lstStyle/>
-          <a:p>
-            <a:pPr algn="ctr"/>
-            <a:r>
-              <a:rPr lang="en-US" sz="1400" b="1" dirty="0" smtClean="0"/>
-              <a:t>IPS Product Detail</a:t>
-            </a:r>
-            <a:endParaRPr lang="en-US" sz="1400" b="1" dirty="0"/>
-          </a:p>
-        </p:txBody>
-      </p:sp>
-      <p:sp>
-        <p:nvSpPr>
-          <p:cNvPr id="7" name="Flowchart: Magnetic Disk 6"/>
-          <p:cNvSpPr/>
-          <p:nvPr/>
-        </p:nvSpPr>
-        <p:spPr>
-          <a:xfrm>
-            <a:off x="3930969" y="1554480"/>
-            <a:ext cx="2056828" cy="699322"/>
-          </a:xfrm>
-          <a:prstGeom prst="flowChartMagneticDisk">
-            <a:avLst/>
-          </a:prstGeom>
-          <a:ln w="28575"/>
-        </p:spPr>
-        <p:style>
-          <a:lnRef idx="2">
-            <a:schemeClr val="accent1">
-              <a:shade val="50000"/>
-            </a:schemeClr>
-          </a:lnRef>
-          <a:fillRef idx="1">
-            <a:schemeClr val="accent1"/>
-          </a:fillRef>
-          <a:effectRef idx="0">
-            <a:schemeClr val="accent1"/>
-          </a:effectRef>
-          <a:fontRef idx="minor">
-            <a:schemeClr val="lt1"/>
-          </a:fontRef>
-        </p:style>
-        <p:txBody>
-          <a:bodyPr rtlCol="0" anchor="ctr"/>
-          <a:lstStyle/>
-          <a:p>
-            <a:pPr algn="ctr"/>
-            <a:r>
-              <a:rPr lang="en-US" sz="1400" b="1" dirty="0" smtClean="0"/>
-              <a:t>IPS_BILLED_NVD_DATA</a:t>
-            </a:r>
-            <a:endParaRPr lang="en-US" sz="1400" b="1" dirty="0"/>
-          </a:p>
-        </p:txBody>
-      </p:sp>
-      <p:sp>
-        <p:nvSpPr>
-          <p:cNvPr id="8" name="Flowchart: Magnetic Disk 7"/>
-          <p:cNvSpPr/>
-          <p:nvPr/>
-        </p:nvSpPr>
-        <p:spPr>
-          <a:xfrm>
-            <a:off x="2105217" y="5758520"/>
-            <a:ext cx="2740152" cy="699322"/>
-          </a:xfrm>
-          <a:prstGeom prst="flowChartMagneticDisk">
-            <a:avLst/>
-          </a:prstGeom>
-          <a:ln/>
-        </p:spPr>
-        <p:style>
-          <a:lnRef idx="2">
-            <a:schemeClr val="accent6">
-              <a:shade val="50000"/>
-            </a:schemeClr>
-          </a:lnRef>
-          <a:fillRef idx="1">
-            <a:schemeClr val="accent6"/>
-          </a:fillRef>
-          <a:effectRef idx="0">
-            <a:schemeClr val="accent6"/>
-          </a:effectRef>
-          <a:fontRef idx="minor">
-            <a:schemeClr val="lt1"/>
-          </a:fontRef>
-        </p:style>
-        <p:txBody>
-          <a:bodyPr rtlCol="0" anchor="ctr"/>
-          <a:lstStyle/>
-          <a:p>
-            <a:pPr algn="ctr"/>
-            <a:r>
-              <a:rPr lang="en-US" sz="1400" b="1" dirty="0" smtClean="0"/>
-              <a:t>Product Detail + NVD (Clean)</a:t>
-            </a:r>
-            <a:endParaRPr lang="en-US" sz="1400" b="1" dirty="0"/>
-          </a:p>
-        </p:txBody>
-      </p:sp>
-      <p:sp>
-        <p:nvSpPr>
-          <p:cNvPr id="9" name="Flowchart: Internal Storage 8"/>
-          <p:cNvSpPr/>
-          <p:nvPr/>
-        </p:nvSpPr>
-        <p:spPr>
-          <a:xfrm>
-            <a:off x="1452658" y="2948672"/>
-            <a:ext cx="1743456" cy="256032"/>
-          </a:xfrm>
-          <a:prstGeom prst="flowChartInternalStorage">
-            <a:avLst/>
-          </a:prstGeom>
-          <a:ln w="28575"/>
-        </p:spPr>
-        <p:style>
-          <a:lnRef idx="2">
-            <a:schemeClr val="accent1">
-              <a:shade val="50000"/>
-            </a:schemeClr>
-          </a:lnRef>
-          <a:fillRef idx="1">
-            <a:schemeClr val="accent1"/>
-          </a:fillRef>
-          <a:effectRef idx="0">
-            <a:schemeClr val="accent1"/>
-          </a:effectRef>
-          <a:fontRef idx="minor">
-            <a:schemeClr val="lt1"/>
-          </a:fontRef>
-        </p:style>
-        <p:txBody>
-          <a:bodyPr rtlCol="0" anchor="ctr"/>
-          <a:lstStyle/>
-          <a:p>
-            <a:r>
-              <a:rPr lang="en-US" sz="1400" b="1" dirty="0" smtClean="0"/>
-              <a:t>Manufacturer.csv</a:t>
-            </a:r>
-            <a:endParaRPr lang="en-US" sz="1400" b="1" dirty="0"/>
-          </a:p>
-        </p:txBody>
-      </p:sp>
-      <p:sp>
-        <p:nvSpPr>
-          <p:cNvPr id="10" name="Flowchart: Internal Storage 9"/>
-          <p:cNvSpPr/>
-          <p:nvPr/>
-        </p:nvSpPr>
-        <p:spPr>
-          <a:xfrm>
-            <a:off x="1452658" y="3294996"/>
-            <a:ext cx="1743456" cy="256032"/>
-          </a:xfrm>
-          <a:prstGeom prst="flowChartInternalStorage">
-            <a:avLst/>
-          </a:prstGeom>
-          <a:ln w="28575"/>
-        </p:spPr>
-        <p:style>
-          <a:lnRef idx="2">
-            <a:schemeClr val="accent1">
-              <a:shade val="50000"/>
-            </a:schemeClr>
-          </a:lnRef>
-          <a:fillRef idx="1">
-            <a:schemeClr val="accent1"/>
-          </a:fillRef>
-          <a:effectRef idx="0">
-            <a:schemeClr val="accent1"/>
-          </a:effectRef>
-          <a:fontRef idx="minor">
-            <a:schemeClr val="lt1"/>
-          </a:fontRef>
-        </p:style>
-        <p:txBody>
-          <a:bodyPr rtlCol="0" anchor="ctr"/>
-          <a:lstStyle/>
-          <a:p>
-            <a:r>
-              <a:rPr lang="en-US" sz="1400" b="1" dirty="0" smtClean="0"/>
-              <a:t>Distributor.csv</a:t>
-            </a:r>
-            <a:endParaRPr lang="en-US" sz="1400" b="1" dirty="0"/>
-          </a:p>
-        </p:txBody>
-      </p:sp>
-      <p:sp>
-        <p:nvSpPr>
-          <p:cNvPr id="11" name="Flowchart: Internal Storage 10"/>
-          <p:cNvSpPr/>
-          <p:nvPr/>
-        </p:nvSpPr>
-        <p:spPr>
-          <a:xfrm>
-            <a:off x="1452658" y="3641320"/>
-            <a:ext cx="1743456" cy="256032"/>
-          </a:xfrm>
-          <a:prstGeom prst="flowChartInternalStorage">
-            <a:avLst/>
-          </a:prstGeom>
-          <a:ln w="28575"/>
-        </p:spPr>
-        <p:style>
-          <a:lnRef idx="2">
-            <a:schemeClr val="accent1">
-              <a:shade val="50000"/>
-            </a:schemeClr>
-          </a:lnRef>
-          <a:fillRef idx="1">
-            <a:schemeClr val="accent1"/>
-          </a:fillRef>
-          <a:effectRef idx="0">
-            <a:schemeClr val="accent1"/>
-          </a:effectRef>
-          <a:fontRef idx="minor">
-            <a:schemeClr val="lt1"/>
-          </a:fontRef>
-        </p:style>
-        <p:txBody>
-          <a:bodyPr rtlCol="0" anchor="ctr"/>
-          <a:lstStyle/>
-          <a:p>
-            <a:r>
-              <a:rPr lang="en-US" sz="1400" b="1" dirty="0" smtClean="0"/>
-              <a:t>Sector.csv</a:t>
-            </a:r>
-            <a:endParaRPr lang="en-US" sz="1400" b="1" dirty="0"/>
-          </a:p>
-        </p:txBody>
-      </p:sp>
-      <p:sp>
-        <p:nvSpPr>
-          <p:cNvPr id="12" name="Flowchart: Magnetic Disk 11"/>
-          <p:cNvSpPr/>
-          <p:nvPr/>
-        </p:nvSpPr>
-        <p:spPr>
-          <a:xfrm>
-            <a:off x="1295972" y="4495800"/>
-            <a:ext cx="2056828" cy="699322"/>
-          </a:xfrm>
-          <a:prstGeom prst="flowChartMagneticDisk">
-            <a:avLst/>
-          </a:prstGeom>
-          <a:ln/>
-        </p:spPr>
-        <p:style>
-          <a:lnRef idx="2">
-            <a:schemeClr val="accent6">
-              <a:shade val="50000"/>
-            </a:schemeClr>
-          </a:lnRef>
-          <a:fillRef idx="1">
-            <a:schemeClr val="accent6"/>
-          </a:fillRef>
-          <a:effectRef idx="0">
-            <a:schemeClr val="accent6"/>
-          </a:effectRef>
-          <a:fontRef idx="minor">
-            <a:schemeClr val="lt1"/>
-          </a:fontRef>
-        </p:style>
-        <p:txBody>
-          <a:bodyPr rtlCol="0" anchor="ctr"/>
-          <a:lstStyle/>
-          <a:p>
-            <a:pPr algn="ctr"/>
-            <a:r>
-              <a:rPr lang="en-US" sz="1400" b="1" dirty="0" smtClean="0"/>
-              <a:t>Product Detail (Clean)</a:t>
-            </a:r>
-            <a:endParaRPr lang="en-US" sz="1400" b="1" dirty="0"/>
-          </a:p>
-        </p:txBody>
-      </p:sp>
-      <p:sp>
-        <p:nvSpPr>
-          <p:cNvPr id="13" name="Flowchart: Magnetic Disk 12"/>
-          <p:cNvSpPr/>
-          <p:nvPr/>
-        </p:nvSpPr>
-        <p:spPr>
-          <a:xfrm>
-            <a:off x="3930969" y="4495800"/>
-            <a:ext cx="2056828" cy="699322"/>
-          </a:xfrm>
-          <a:prstGeom prst="flowChartMagneticDisk">
-            <a:avLst/>
-          </a:prstGeom>
-          <a:ln/>
-        </p:spPr>
-        <p:style>
-          <a:lnRef idx="2">
-            <a:schemeClr val="accent6">
-              <a:shade val="50000"/>
-            </a:schemeClr>
-          </a:lnRef>
-          <a:fillRef idx="1">
-            <a:schemeClr val="accent6"/>
-          </a:fillRef>
-          <a:effectRef idx="0">
-            <a:schemeClr val="accent6"/>
-          </a:effectRef>
-          <a:fontRef idx="minor">
-            <a:schemeClr val="lt1"/>
-          </a:fontRef>
-        </p:style>
-        <p:txBody>
-          <a:bodyPr rtlCol="0" anchor="ctr"/>
-          <a:lstStyle/>
-          <a:p>
-            <a:pPr algn="ctr"/>
-            <a:r>
-              <a:rPr lang="en-US" sz="1400" b="1" dirty="0" smtClean="0"/>
-              <a:t>Billed NVD (Clean)</a:t>
-            </a:r>
-            <a:endParaRPr lang="en-US" sz="1400" b="1" dirty="0"/>
-          </a:p>
-        </p:txBody>
-      </p:sp>
-      <p:sp>
-        <p:nvSpPr>
-          <p:cNvPr id="3" name="Flowchart: Alternate Process 2"/>
-          <p:cNvSpPr/>
-          <p:nvPr/>
-        </p:nvSpPr>
-        <p:spPr>
-          <a:xfrm>
-            <a:off x="7924800" y="1600200"/>
-            <a:ext cx="3657600" cy="876106"/>
-          </a:xfrm>
-          <a:prstGeom prst="flowChartAlternateProcess">
-            <a:avLst/>
-          </a:prstGeom>
-        </p:spPr>
-        <p:style>
-          <a:lnRef idx="1">
-            <a:schemeClr val="accent6"/>
-          </a:lnRef>
-          <a:fillRef idx="2">
-            <a:schemeClr val="accent6"/>
-          </a:fillRef>
-          <a:effectRef idx="1">
-            <a:schemeClr val="accent6"/>
-          </a:effectRef>
-          <a:fontRef idx="minor">
-            <a:schemeClr val="dk1"/>
-          </a:fontRef>
-        </p:style>
-        <p:txBody>
-          <a:bodyPr rtlCol="0" anchor="ctr"/>
-          <a:lstStyle/>
-          <a:p>
-            <a:pPr marL="457200" algn="ctr"/>
-            <a:r>
-              <a:rPr lang="en-US" dirty="0" smtClean="0"/>
-              <a:t>Tableau Prep Builder</a:t>
-            </a:r>
-          </a:p>
-          <a:p>
-            <a:pPr marL="457200" algn="ctr"/>
-            <a:r>
-              <a:rPr lang="en-US" dirty="0" smtClean="0"/>
-              <a:t>(clean and merge data)</a:t>
-            </a:r>
-            <a:endParaRPr lang="en-US" dirty="0"/>
-          </a:p>
-        </p:txBody>
-      </p:sp>
-      <p:sp>
-        <p:nvSpPr>
-          <p:cNvPr id="24" name="Flowchart: Alternate Process 23"/>
-          <p:cNvSpPr/>
-          <p:nvPr/>
-        </p:nvSpPr>
-        <p:spPr>
-          <a:xfrm>
-            <a:off x="7924800" y="4267200"/>
-            <a:ext cx="3657600" cy="876106"/>
-          </a:xfrm>
-          <a:prstGeom prst="flowChartAlternateProcess">
-            <a:avLst/>
-          </a:prstGeom>
-        </p:spPr>
-        <p:style>
-          <a:lnRef idx="1">
-            <a:schemeClr val="accent6"/>
-          </a:lnRef>
-          <a:fillRef idx="2">
-            <a:schemeClr val="accent6"/>
-          </a:fillRef>
-          <a:effectRef idx="1">
-            <a:schemeClr val="accent6"/>
-          </a:effectRef>
-          <a:fontRef idx="minor">
-            <a:schemeClr val="dk1"/>
-          </a:fontRef>
-        </p:style>
-        <p:txBody>
-          <a:bodyPr rtlCol="0" anchor="ctr"/>
-          <a:lstStyle/>
-          <a:p>
-            <a:pPr marL="457200" algn="ctr"/>
-            <a:r>
-              <a:rPr lang="en-US" dirty="0" smtClean="0"/>
-              <a:t>Excel</a:t>
-            </a:r>
-          </a:p>
-          <a:p>
-            <a:pPr marL="457200" algn="ctr"/>
-            <a:r>
-              <a:rPr lang="en-US" dirty="0" smtClean="0"/>
-              <a:t>(to modify .csv files)</a:t>
-            </a:r>
-            <a:endParaRPr lang="en-US" dirty="0"/>
-          </a:p>
-        </p:txBody>
-      </p:sp>
-      <p:sp>
-        <p:nvSpPr>
-          <p:cNvPr id="25" name="Flowchart: Alternate Process 24"/>
-          <p:cNvSpPr/>
-          <p:nvPr/>
-        </p:nvSpPr>
-        <p:spPr>
-          <a:xfrm>
-            <a:off x="7924800" y="2852263"/>
-            <a:ext cx="3657600" cy="876106"/>
-          </a:xfrm>
-          <a:prstGeom prst="flowChartAlternateProcess">
-            <a:avLst/>
-          </a:prstGeom>
-        </p:spPr>
-        <p:style>
-          <a:lnRef idx="1">
-            <a:schemeClr val="accent6"/>
-          </a:lnRef>
-          <a:fillRef idx="2">
-            <a:schemeClr val="accent6"/>
-          </a:fillRef>
-          <a:effectRef idx="1">
-            <a:schemeClr val="accent6"/>
-          </a:effectRef>
-          <a:fontRef idx="minor">
-            <a:schemeClr val="dk1"/>
-          </a:fontRef>
-        </p:style>
-        <p:txBody>
-          <a:bodyPr rtlCol="0" anchor="ctr"/>
-          <a:lstStyle/>
-          <a:p>
-            <a:pPr marL="457200" algn="ctr"/>
-            <a:r>
-              <a:rPr lang="en-US" dirty="0" smtClean="0"/>
-              <a:t>GitHub desktop</a:t>
-            </a:r>
-          </a:p>
-          <a:p>
-            <a:pPr marL="457200" algn="ctr"/>
-            <a:r>
-              <a:rPr lang="en-US" dirty="0" smtClean="0"/>
-              <a:t>(clean and merge data)</a:t>
-            </a:r>
-            <a:endParaRPr lang="en-US" dirty="0"/>
-          </a:p>
-        </p:txBody>
-      </p:sp>
-      <p:sp>
-        <p:nvSpPr>
-          <p:cNvPr id="27" name="Flowchart: Alternate Process 26"/>
-          <p:cNvSpPr/>
-          <p:nvPr/>
-        </p:nvSpPr>
-        <p:spPr>
-          <a:xfrm>
-            <a:off x="7924800" y="5348926"/>
-            <a:ext cx="3657600" cy="876106"/>
-          </a:xfrm>
-          <a:prstGeom prst="flowChartAlternateProcess">
-            <a:avLst/>
-          </a:prstGeom>
-        </p:spPr>
-        <p:style>
-          <a:lnRef idx="1">
-            <a:schemeClr val="accent6"/>
-          </a:lnRef>
-          <a:fillRef idx="2">
-            <a:schemeClr val="accent6"/>
-          </a:fillRef>
-          <a:effectRef idx="1">
-            <a:schemeClr val="accent6"/>
-          </a:effectRef>
-          <a:fontRef idx="minor">
-            <a:schemeClr val="dk1"/>
-          </a:fontRef>
-        </p:style>
-        <p:txBody>
-          <a:bodyPr rtlCol="0" anchor="ctr"/>
-          <a:lstStyle/>
-          <a:p>
-            <a:pPr marL="457200" algn="ctr"/>
-            <a:r>
-              <a:rPr lang="en-US" dirty="0" smtClean="0"/>
-              <a:t>Tableau Online</a:t>
-            </a:r>
-          </a:p>
-          <a:p>
-            <a:pPr marL="457200" algn="ctr"/>
-            <a:r>
-              <a:rPr lang="en-US" dirty="0" smtClean="0"/>
-              <a:t>(verify files are updated)</a:t>
-            </a:r>
-            <a:endParaRPr lang="en-US" dirty="0"/>
-          </a:p>
-        </p:txBody>
-      </p:sp>
-      <p:pic>
-        <p:nvPicPr>
-          <p:cNvPr id="4" name="Picture 3"/>
-          <p:cNvPicPr>
-            <a:picLocks noChangeAspect="1"/>
-          </p:cNvPicPr>
-          <p:nvPr/>
-        </p:nvPicPr>
-        <p:blipFill rotWithShape="1">
-          <a:blip r:embed="rId2"/>
-          <a:srcRect l="3963" t="5111" r="8341" b="10000"/>
-          <a:stretch/>
-        </p:blipFill>
-        <p:spPr>
-          <a:xfrm>
-            <a:off x="8029012" y="3047999"/>
-            <a:ext cx="657788" cy="545781"/>
-          </a:xfrm>
-          <a:prstGeom prst="rect">
-            <a:avLst/>
-          </a:prstGeom>
-        </p:spPr>
-      </p:pic>
-      <p:pic>
-        <p:nvPicPr>
-          <p:cNvPr id="5" name="Picture 4"/>
-          <p:cNvPicPr>
-            <a:picLocks noChangeAspect="1"/>
-          </p:cNvPicPr>
-          <p:nvPr/>
-        </p:nvPicPr>
-        <p:blipFill>
-          <a:blip r:embed="rId3"/>
-          <a:stretch>
-            <a:fillRect/>
-          </a:stretch>
-        </p:blipFill>
-        <p:spPr>
-          <a:xfrm>
-            <a:off x="8005286" y="1752600"/>
-            <a:ext cx="605314" cy="621243"/>
-          </a:xfrm>
-          <a:prstGeom prst="rect">
-            <a:avLst/>
-          </a:prstGeom>
-        </p:spPr>
-      </p:pic>
-      <p:pic>
-        <p:nvPicPr>
-          <p:cNvPr id="14" name="Picture 13"/>
-          <p:cNvPicPr>
-            <a:picLocks noChangeAspect="1"/>
-          </p:cNvPicPr>
-          <p:nvPr/>
-        </p:nvPicPr>
-        <p:blipFill>
-          <a:blip r:embed="rId4"/>
-          <a:stretch>
-            <a:fillRect/>
-          </a:stretch>
-        </p:blipFill>
-        <p:spPr>
-          <a:xfrm>
-            <a:off x="8077199" y="5486401"/>
-            <a:ext cx="637613" cy="623122"/>
-          </a:xfrm>
-          <a:prstGeom prst="rect">
-            <a:avLst/>
-          </a:prstGeom>
-        </p:spPr>
-      </p:pic>
-      <p:pic>
-        <p:nvPicPr>
-          <p:cNvPr id="19" name="Picture 18"/>
-          <p:cNvPicPr>
-            <a:picLocks noChangeAspect="1"/>
-          </p:cNvPicPr>
-          <p:nvPr/>
-        </p:nvPicPr>
-        <p:blipFill>
-          <a:blip r:embed="rId5"/>
-          <a:stretch>
-            <a:fillRect/>
-          </a:stretch>
-        </p:blipFill>
-        <p:spPr>
-          <a:xfrm>
-            <a:off x="8153400" y="4457700"/>
-            <a:ext cx="514350" cy="504825"/>
-          </a:xfrm>
-          <a:prstGeom prst="rect">
-            <a:avLst/>
-          </a:prstGeom>
-        </p:spPr>
-      </p:pic>
-      <p:sp>
-        <p:nvSpPr>
-          <p:cNvPr id="30" name="Title 1"/>
+              <a:rPr lang="en-US" dirty="0"/>
+              <a:t>Steps</a:t>
+            </a:r>
+          </a:p>
+        </p:txBody>
+      </p:sp>
+      <p:sp>
+        <p:nvSpPr>
+          <p:cNvPr id="3" name="Title 1">
+            <a:extLst>
+              <a:ext uri="{FF2B5EF4-FFF2-40B4-BE49-F238E27FC236}">
+                <a16:creationId xmlns:a16="http://schemas.microsoft.com/office/drawing/2014/main" id="{5D42BDAA-1755-401F-93A3-B7C175DCDC59}"/>
+              </a:ext>
+            </a:extLst>
+          </p:cNvPr>
           <p:cNvSpPr txBox="1">
             <a:spLocks/>
           </p:cNvSpPr>
@@ -3729,8 +3055,8 @@
         </p:nvSpPr>
         <p:spPr>
           <a:xfrm>
-            <a:off x="7086600" y="363411"/>
-            <a:ext cx="4800600" cy="935037"/>
+            <a:off x="533400" y="1108024"/>
+            <a:ext cx="11201400" cy="5140375"/>
           </a:xfrm>
           <a:prstGeom prst="rect">
             <a:avLst/>
@@ -3760,441 +3086,341 @@
             </a:lvl1pPr>
           </a:lstStyle>
           <a:p>
-            <a:r>
-              <a:rPr lang="en-US" dirty="0" smtClean="0">
-                <a:solidFill>
-                  <a:srgbClr val="92D050"/>
-                </a:solidFill>
-              </a:rPr>
-              <a:t>Programs Used</a:t>
-            </a:r>
-            <a:endParaRPr lang="en-US" dirty="0">
-              <a:solidFill>
-                <a:srgbClr val="92D050"/>
-              </a:solidFill>
-            </a:endParaRPr>
-          </a:p>
-        </p:txBody>
-      </p:sp>
-      <p:sp>
-        <p:nvSpPr>
-          <p:cNvPr id="32" name="Title 1"/>
-          <p:cNvSpPr txBox="1">
-            <a:spLocks/>
-          </p:cNvSpPr>
-          <p:nvPr/>
-        </p:nvSpPr>
-        <p:spPr>
-          <a:xfrm>
-            <a:off x="105833" y="3078409"/>
-            <a:ext cx="1037167" cy="731591"/>
-          </a:xfrm>
-          <a:prstGeom prst="rect">
-            <a:avLst/>
-          </a:prstGeom>
-        </p:spPr>
-        <p:txBody>
-          <a:bodyPr vert="horz" lIns="91440" tIns="45720" rIns="91440" bIns="45720" rtlCol="0" anchor="b">
-            <a:normAutofit/>
-          </a:bodyPr>
-          <a:lstStyle>
-            <a:lvl1pPr algn="ctr" defTabSz="914400" rtl="0" eaLnBrk="1" latinLnBrk="0" hangingPunct="1">
-              <a:lnSpc>
-                <a:spcPct val="90000"/>
-              </a:lnSpc>
-              <a:spcBef>
-                <a:spcPct val="0"/>
-              </a:spcBef>
-              <a:buNone/>
-              <a:defRPr sz="6000" kern="1200">
-                <a:solidFill>
-                  <a:schemeClr val="tx1"/>
-                </a:solidFill>
-                <a:latin typeface="+mj-lt"/>
-                <a:ea typeface="+mj-ea"/>
-                <a:cs typeface="+mj-cs"/>
-              </a:defRPr>
-            </a:lvl1pPr>
-          </a:lstStyle>
-          <a:p>
-            <a:pPr algn="l"/>
-            <a:r>
-              <a:rPr lang="en-US" sz="1200" dirty="0" smtClean="0">
+            <a:pPr marL="228600" indent="-228600" algn="l">
+              <a:buFont typeface="+mj-lt"/>
+              <a:buAutoNum type="arabicPeriod"/>
+            </a:pPr>
+            <a:r>
+              <a:rPr lang="en-US" sz="1200" b="1" dirty="0">
                 <a:solidFill>
                   <a:schemeClr val="accent1"/>
                 </a:solidFill>
               </a:rPr>
-              <a:t>Mapping files</a:t>
-            </a:r>
-          </a:p>
-          <a:p>
-            <a:pPr algn="l"/>
-            <a:r>
-              <a:rPr lang="en-US" sz="1200" dirty="0" smtClean="0">
+              <a:t>Capture before row counts</a:t>
+            </a:r>
+            <a:r>
+              <a:rPr lang="en-US" sz="1200" dirty="0">
                 <a:solidFill>
                   <a:schemeClr val="accent1"/>
                 </a:solidFill>
               </a:rPr>
-              <a:t>GitHub </a:t>
-            </a:r>
-          </a:p>
-          <a:p>
-            <a:pPr algn="l"/>
-            <a:r>
-              <a:rPr lang="en-US" sz="1200" dirty="0" smtClean="0">
+              <a:t>: before starting record the number of rows in the current files so we can compare them to the newly created files.  If we find a difference, then there is likely a problem. Open Tableau Desktop C:\Users\teriko.moriyasu\Documents\GitHub\TerikoTableau\ExtraDetails\Row Count Before-After </a:t>
+            </a:r>
+            <a:r>
+              <a:rPr lang="en-US" sz="1200" dirty="0" err="1">
                 <a:solidFill>
                   <a:schemeClr val="accent1"/>
                 </a:solidFill>
               </a:rPr>
-              <a:t>repository</a:t>
-            </a:r>
+              <a:t>Checker.twb</a:t>
+            </a:r>
+            <a:r>
+              <a:rPr lang="en-US" sz="1200" dirty="0">
+                <a:solidFill>
+                  <a:schemeClr val="accent1"/>
+                </a:solidFill>
+              </a:rPr>
+              <a:t> and record the results in this spreadsheet Open C:\Users\teriko.moriyasu\Documents\GitHub\TerikoTableau\ExtraDetails\Old vs New Compare record counts.xlsx. </a:t>
+            </a:r>
+          </a:p>
+          <a:p>
+            <a:pPr marL="228600" indent="-228600" algn="l">
+              <a:buFont typeface="+mj-lt"/>
+              <a:buAutoNum type="arabicPeriod"/>
+            </a:pPr>
             <a:endParaRPr lang="en-US" sz="1200" dirty="0">
               <a:solidFill>
                 <a:schemeClr val="accent1"/>
               </a:solidFill>
             </a:endParaRPr>
           </a:p>
-        </p:txBody>
-      </p:sp>
-      <p:sp>
-        <p:nvSpPr>
-          <p:cNvPr id="33" name="Title 1"/>
-          <p:cNvSpPr txBox="1">
-            <a:spLocks/>
-          </p:cNvSpPr>
-          <p:nvPr/>
-        </p:nvSpPr>
-        <p:spPr>
-          <a:xfrm>
-            <a:off x="-38103" y="1731589"/>
-            <a:ext cx="1028703" cy="380846"/>
-          </a:xfrm>
-          <a:prstGeom prst="rect">
-            <a:avLst/>
-          </a:prstGeom>
-        </p:spPr>
-        <p:txBody>
-          <a:bodyPr vert="horz" lIns="91440" tIns="45720" rIns="91440" bIns="45720" rtlCol="0" anchor="b">
-            <a:normAutofit fontScale="92500"/>
-          </a:bodyPr>
-          <a:lstStyle>
-            <a:lvl1pPr algn="ctr" defTabSz="914400" rtl="0" eaLnBrk="1" latinLnBrk="0" hangingPunct="1">
-              <a:lnSpc>
-                <a:spcPct val="90000"/>
-              </a:lnSpc>
-              <a:spcBef>
-                <a:spcPct val="0"/>
-              </a:spcBef>
-              <a:buNone/>
-              <a:defRPr sz="6000" kern="1200">
-                <a:solidFill>
-                  <a:schemeClr val="tx1"/>
-                </a:solidFill>
-                <a:latin typeface="+mj-lt"/>
-                <a:ea typeface="+mj-ea"/>
-                <a:cs typeface="+mj-cs"/>
-              </a:defRPr>
-            </a:lvl1pPr>
-          </a:lstStyle>
-          <a:p>
-            <a:pPr algn="l"/>
-            <a:r>
-              <a:rPr lang="en-US" sz="1200" dirty="0" smtClean="0">
+          <a:p>
+            <a:pPr marL="228600" indent="-228600" algn="l">
+              <a:buFont typeface="+mj-lt"/>
+              <a:buAutoNum type="arabicPeriod"/>
+            </a:pPr>
+            <a:r>
+              <a:rPr lang="en-US" sz="1200" b="1" dirty="0">
                 <a:solidFill>
                   <a:schemeClr val="accent1"/>
                 </a:solidFill>
               </a:rPr>
-              <a:t>Tableau Online</a:t>
-            </a:r>
+              <a:t>Update mapping files </a:t>
+            </a:r>
+            <a:r>
+              <a:rPr lang="en-US" sz="1200" dirty="0">
+                <a:solidFill>
+                  <a:schemeClr val="accent1"/>
+                </a:solidFill>
+              </a:rPr>
+              <a:t>if needed (manufacturer.csv, distributor.csv, segment.csv), if not skip this step.  Open them in Excel make any changes, highlight/select just the cells to save into the CSV and re-save the file.</a:t>
+            </a:r>
+          </a:p>
+          <a:p>
+            <a:pPr marL="228600" indent="-228600" algn="l">
+              <a:buFont typeface="+mj-lt"/>
+              <a:buAutoNum type="arabicPeriod"/>
+            </a:pPr>
             <a:endParaRPr lang="en-US" sz="1200" dirty="0">
               <a:solidFill>
                 <a:schemeClr val="accent1"/>
               </a:solidFill>
             </a:endParaRPr>
           </a:p>
-        </p:txBody>
-      </p:sp>
-      <p:sp>
-        <p:nvSpPr>
-          <p:cNvPr id="28" name="Left Brace 27"/>
-          <p:cNvSpPr/>
-          <p:nvPr/>
-        </p:nvSpPr>
-        <p:spPr>
-          <a:xfrm>
-            <a:off x="952500" y="1513526"/>
-            <a:ext cx="228600" cy="962780"/>
-          </a:xfrm>
-          <a:prstGeom prst="leftBrace">
-            <a:avLst/>
-          </a:prstGeom>
-          <a:ln>
-            <a:solidFill>
-              <a:schemeClr val="accent1">
-                <a:lumMod val="40000"/>
-                <a:lumOff val="60000"/>
-              </a:schemeClr>
-            </a:solidFill>
-          </a:ln>
-        </p:spPr>
-        <p:style>
-          <a:lnRef idx="1">
-            <a:schemeClr val="accent1"/>
-          </a:lnRef>
-          <a:fillRef idx="0">
-            <a:schemeClr val="accent1"/>
-          </a:fillRef>
-          <a:effectRef idx="0">
-            <a:schemeClr val="accent1"/>
-          </a:effectRef>
-          <a:fontRef idx="minor">
-            <a:schemeClr val="tx1"/>
-          </a:fontRef>
-        </p:style>
-        <p:txBody>
-          <a:bodyPr rtlCol="0" anchor="ctr"/>
-          <a:lstStyle/>
-          <a:p>
-            <a:pPr algn="ctr"/>
-            <a:endParaRPr lang="en-US"/>
-          </a:p>
-        </p:txBody>
-      </p:sp>
-      <p:sp>
-        <p:nvSpPr>
-          <p:cNvPr id="35" name="Left Brace 34"/>
-          <p:cNvSpPr/>
-          <p:nvPr/>
-        </p:nvSpPr>
-        <p:spPr>
-          <a:xfrm>
-            <a:off x="952500" y="2969211"/>
-            <a:ext cx="228600" cy="962780"/>
-          </a:xfrm>
-          <a:prstGeom prst="leftBrace">
-            <a:avLst/>
-          </a:prstGeom>
-          <a:ln>
-            <a:solidFill>
-              <a:schemeClr val="accent1">
-                <a:lumMod val="40000"/>
-                <a:lumOff val="60000"/>
-              </a:schemeClr>
-            </a:solidFill>
-          </a:ln>
-        </p:spPr>
-        <p:style>
-          <a:lnRef idx="1">
-            <a:schemeClr val="accent1"/>
-          </a:lnRef>
-          <a:fillRef idx="0">
-            <a:schemeClr val="accent1"/>
-          </a:fillRef>
-          <a:effectRef idx="0">
-            <a:schemeClr val="accent1"/>
-          </a:effectRef>
-          <a:fontRef idx="minor">
-            <a:schemeClr val="tx1"/>
-          </a:fontRef>
-        </p:style>
-        <p:txBody>
-          <a:bodyPr rtlCol="0" anchor="ctr"/>
-          <a:lstStyle/>
-          <a:p>
-            <a:pPr algn="ctr"/>
-            <a:endParaRPr lang="en-US"/>
-          </a:p>
-        </p:txBody>
-      </p:sp>
-      <p:sp>
-        <p:nvSpPr>
-          <p:cNvPr id="36" name="Left Brace 35"/>
-          <p:cNvSpPr/>
-          <p:nvPr/>
-        </p:nvSpPr>
-        <p:spPr>
-          <a:xfrm>
-            <a:off x="952500" y="4473858"/>
-            <a:ext cx="228600" cy="1698342"/>
-          </a:xfrm>
-          <a:prstGeom prst="leftBrace">
-            <a:avLst/>
-          </a:prstGeom>
-          <a:ln>
-            <a:solidFill>
-              <a:schemeClr val="accent1">
-                <a:lumMod val="40000"/>
-                <a:lumOff val="60000"/>
-              </a:schemeClr>
-            </a:solidFill>
-          </a:ln>
-        </p:spPr>
-        <p:style>
-          <a:lnRef idx="1">
-            <a:schemeClr val="accent1"/>
-          </a:lnRef>
-          <a:fillRef idx="0">
-            <a:schemeClr val="accent1"/>
-          </a:fillRef>
-          <a:effectRef idx="0">
-            <a:schemeClr val="accent1"/>
-          </a:effectRef>
-          <a:fontRef idx="minor">
-            <a:schemeClr val="tx1"/>
-          </a:fontRef>
-        </p:style>
-        <p:txBody>
-          <a:bodyPr rtlCol="0" anchor="ctr"/>
-          <a:lstStyle/>
-          <a:p>
-            <a:pPr algn="ctr"/>
-            <a:endParaRPr lang="en-US"/>
-          </a:p>
-        </p:txBody>
-      </p:sp>
-      <p:sp>
-        <p:nvSpPr>
-          <p:cNvPr id="37" name="Title 1"/>
-          <p:cNvSpPr txBox="1">
-            <a:spLocks/>
-          </p:cNvSpPr>
-          <p:nvPr/>
-        </p:nvSpPr>
-        <p:spPr>
-          <a:xfrm>
-            <a:off x="-38103" y="5054754"/>
-            <a:ext cx="1028703" cy="380846"/>
-          </a:xfrm>
-          <a:prstGeom prst="rect">
-            <a:avLst/>
-          </a:prstGeom>
-        </p:spPr>
-        <p:txBody>
-          <a:bodyPr vert="horz" lIns="91440" tIns="45720" rIns="91440" bIns="45720" rtlCol="0" anchor="b">
-            <a:normAutofit fontScale="92500"/>
-          </a:bodyPr>
-          <a:lstStyle>
-            <a:lvl1pPr algn="ctr" defTabSz="914400" rtl="0" eaLnBrk="1" latinLnBrk="0" hangingPunct="1">
-              <a:lnSpc>
-                <a:spcPct val="90000"/>
-              </a:lnSpc>
-              <a:spcBef>
-                <a:spcPct val="0"/>
-              </a:spcBef>
-              <a:buNone/>
-              <a:defRPr sz="6000" kern="1200">
-                <a:solidFill>
-                  <a:schemeClr val="tx1"/>
-                </a:solidFill>
-                <a:latin typeface="+mj-lt"/>
-                <a:ea typeface="+mj-ea"/>
-                <a:cs typeface="+mj-cs"/>
-              </a:defRPr>
-            </a:lvl1pPr>
-          </a:lstStyle>
-          <a:p>
-            <a:pPr algn="l"/>
-            <a:r>
-              <a:rPr lang="en-US" sz="1200" dirty="0" smtClean="0">
+          <a:p>
+            <a:pPr marL="228600" indent="-228600" algn="l">
+              <a:buFont typeface="+mj-lt"/>
+              <a:buAutoNum type="arabicPeriod"/>
+            </a:pPr>
+            <a:r>
+              <a:rPr lang="en-US" sz="1200" b="1" dirty="0">
                 <a:solidFill>
                   <a:schemeClr val="accent1"/>
                 </a:solidFill>
               </a:rPr>
-              <a:t>Tableau Online</a:t>
-            </a:r>
+              <a:t>Refresh the exported package flows: </a:t>
+            </a:r>
+            <a:r>
+              <a:rPr lang="en-US" sz="1200" dirty="0">
+                <a:solidFill>
+                  <a:schemeClr val="accent1"/>
+                </a:solidFill>
+              </a:rPr>
+              <a:t>Close both Tableau Prep &amp; Desktop.  Open Tableau Prep via toolbar right click and open Detail+NVD_Step-1.tfl, when prompted log into tableau online. File, Export Packaged Workflow, accept the default name, accept the fact that it will use the 3 .csv files, it will then create a Detail+NVD_Step-1.tflx version of the file.  Do the same for the Detail+NVD_Step-2.tfl to create the Detail+NVD_Step-1.tflx.</a:t>
+            </a:r>
+          </a:p>
+          <a:p>
+            <a:pPr marL="228600" indent="-228600" algn="l">
+              <a:buFont typeface="+mj-lt"/>
+              <a:buAutoNum type="arabicPeriod"/>
+            </a:pPr>
             <a:endParaRPr lang="en-US" sz="1200" dirty="0">
               <a:solidFill>
                 <a:schemeClr val="accent1"/>
               </a:solidFill>
             </a:endParaRPr>
           </a:p>
-        </p:txBody>
-      </p:sp>
-      <p:cxnSp>
-        <p:nvCxnSpPr>
-          <p:cNvPr id="38" name="Straight Arrow Connector 37"/>
-          <p:cNvCxnSpPr>
-            <a:stCxn id="6" idx="3"/>
-            <a:endCxn id="12" idx="1"/>
-          </p:cNvCxnSpPr>
-          <p:nvPr/>
-        </p:nvCxnSpPr>
-        <p:spPr>
-          <a:xfrm>
-            <a:off x="2324386" y="2253802"/>
-            <a:ext cx="0" cy="2241998"/>
-          </a:xfrm>
-          <a:prstGeom prst="straightConnector1">
-            <a:avLst/>
-          </a:prstGeom>
-          <a:ln w="25400">
-            <a:tailEnd type="triangle" w="lg" len="lg"/>
-          </a:ln>
-        </p:spPr>
-        <p:style>
-          <a:lnRef idx="1">
-            <a:schemeClr val="accent1"/>
-          </a:lnRef>
-          <a:fillRef idx="0">
-            <a:schemeClr val="accent1"/>
-          </a:fillRef>
-          <a:effectRef idx="0">
-            <a:schemeClr val="accent1"/>
-          </a:effectRef>
-          <a:fontRef idx="minor">
-            <a:schemeClr val="tx1"/>
-          </a:fontRef>
-        </p:style>
-      </p:cxnSp>
-      <p:sp>
-        <p:nvSpPr>
-          <p:cNvPr id="39" name="TextBox 38"/>
-          <p:cNvSpPr txBox="1"/>
-          <p:nvPr/>
-        </p:nvSpPr>
-        <p:spPr>
-          <a:xfrm>
-            <a:off x="1828800" y="2411361"/>
-            <a:ext cx="1125693" cy="307777"/>
-          </a:xfrm>
-          <a:prstGeom prst="rect">
-            <a:avLst/>
-          </a:prstGeom>
-          <a:solidFill>
-            <a:schemeClr val="bg1"/>
-          </a:solidFill>
-        </p:spPr>
-        <p:txBody>
-          <a:bodyPr wrap="none" rtlCol="0">
-            <a:spAutoFit/>
-          </a:bodyPr>
-          <a:lstStyle/>
-          <a:p>
-            <a:r>
-              <a:rPr lang="en-US" sz="1400" dirty="0" smtClean="0"/>
-              <a:t>Remap fields</a:t>
-            </a:r>
-            <a:endParaRPr lang="en-US" sz="1400" dirty="0"/>
+          <a:p>
+            <a:pPr marL="228600" indent="-228600" algn="l">
+              <a:buFont typeface="+mj-lt"/>
+              <a:buAutoNum type="arabicPeriod"/>
+            </a:pPr>
+            <a:r>
+              <a:rPr lang="en-US" sz="1200" b="1" dirty="0">
+                <a:solidFill>
+                  <a:schemeClr val="accent1"/>
+                </a:solidFill>
+              </a:rPr>
+              <a:t>Run the Detail+NVD_Step-1.tflx and Detail+NVD_Step-2.tflx</a:t>
+            </a:r>
+          </a:p>
+          <a:p>
+            <a:pPr marL="228600" indent="-228600" algn="l">
+              <a:buFont typeface="+mj-lt"/>
+              <a:buAutoNum type="arabicPeriod"/>
+            </a:pPr>
+            <a:endParaRPr lang="en-US" sz="1200" dirty="0">
+              <a:solidFill>
+                <a:schemeClr val="accent1"/>
+              </a:solidFill>
+            </a:endParaRPr>
+          </a:p>
+          <a:p>
+            <a:pPr marL="228600" indent="-228600" algn="l">
+              <a:buFont typeface="+mj-lt"/>
+              <a:buAutoNum type="arabicPeriod"/>
+            </a:pPr>
+            <a:endParaRPr lang="en-US" sz="1200" dirty="0">
+              <a:solidFill>
+                <a:schemeClr val="accent1"/>
+              </a:solidFill>
+            </a:endParaRPr>
+          </a:p>
+          <a:p>
+            <a:pPr marL="228600" indent="-228600" algn="l">
+              <a:buFont typeface="+mj-lt"/>
+              <a:buAutoNum type="arabicPeriod"/>
+            </a:pPr>
+            <a:endParaRPr lang="en-US" sz="1200" dirty="0">
+              <a:solidFill>
+                <a:schemeClr val="accent1"/>
+              </a:solidFill>
+            </a:endParaRPr>
+          </a:p>
+          <a:p>
+            <a:pPr marL="228600" indent="-228600" algn="l">
+              <a:buFont typeface="+mj-lt"/>
+              <a:buAutoNum type="arabicPeriod"/>
+            </a:pPr>
+            <a:endParaRPr lang="en-US" sz="1200" dirty="0">
+              <a:solidFill>
+                <a:schemeClr val="accent1"/>
+              </a:solidFill>
+            </a:endParaRPr>
+          </a:p>
+          <a:p>
+            <a:pPr marL="228600" indent="-228600" algn="l">
+              <a:buFont typeface="+mj-lt"/>
+              <a:buAutoNum type="arabicPeriod"/>
+            </a:pPr>
+            <a:endParaRPr lang="en-US" sz="1200" dirty="0">
+              <a:solidFill>
+                <a:schemeClr val="accent1"/>
+              </a:solidFill>
+            </a:endParaRPr>
+          </a:p>
+          <a:p>
+            <a:pPr marL="228600" indent="-228600" algn="l">
+              <a:buFont typeface="+mj-lt"/>
+              <a:buAutoNum type="arabicPeriod"/>
+            </a:pPr>
+            <a:endParaRPr lang="en-US" sz="1200" dirty="0">
+              <a:solidFill>
+                <a:schemeClr val="accent1"/>
+              </a:solidFill>
+            </a:endParaRPr>
+          </a:p>
+          <a:p>
+            <a:pPr marL="228600" indent="-228600" algn="l">
+              <a:buFont typeface="+mj-lt"/>
+              <a:buAutoNum type="arabicPeriod"/>
+            </a:pPr>
+            <a:endParaRPr lang="en-US" sz="1200" dirty="0">
+              <a:solidFill>
+                <a:schemeClr val="accent1"/>
+              </a:solidFill>
+            </a:endParaRPr>
+          </a:p>
+          <a:p>
+            <a:pPr marL="228600" indent="-228600" algn="l">
+              <a:buFont typeface="+mj-lt"/>
+              <a:buAutoNum type="arabicPeriod"/>
+            </a:pPr>
+            <a:endParaRPr lang="en-US" sz="1200" dirty="0">
+              <a:solidFill>
+                <a:schemeClr val="accent1"/>
+              </a:solidFill>
+            </a:endParaRPr>
+          </a:p>
+          <a:p>
+            <a:pPr marL="228600" indent="-228600" algn="l">
+              <a:buFont typeface="+mj-lt"/>
+              <a:buAutoNum type="arabicPeriod"/>
+            </a:pPr>
+            <a:endParaRPr lang="en-US" sz="1200" dirty="0">
+              <a:solidFill>
+                <a:schemeClr val="accent1"/>
+              </a:solidFill>
+            </a:endParaRPr>
+          </a:p>
+          <a:p>
+            <a:pPr marL="228600" indent="-228600" algn="l">
+              <a:buFont typeface="+mj-lt"/>
+              <a:buAutoNum type="arabicPeriod"/>
+            </a:pPr>
+            <a:endParaRPr lang="en-US" sz="1200" dirty="0">
+              <a:solidFill>
+                <a:schemeClr val="accent1"/>
+              </a:solidFill>
+            </a:endParaRPr>
+          </a:p>
+          <a:p>
+            <a:pPr marL="228600" indent="-228600" algn="l">
+              <a:buFont typeface="+mj-lt"/>
+              <a:buAutoNum type="arabicPeriod"/>
+            </a:pPr>
+            <a:endParaRPr lang="en-US" sz="1200" dirty="0">
+              <a:solidFill>
+                <a:schemeClr val="accent1"/>
+              </a:solidFill>
+            </a:endParaRPr>
+          </a:p>
+          <a:p>
+            <a:pPr marL="228600" indent="-228600" algn="l">
+              <a:buFont typeface="+mj-lt"/>
+              <a:buAutoNum type="arabicPeriod"/>
+            </a:pPr>
+            <a:endParaRPr lang="en-US" sz="1200" dirty="0">
+              <a:solidFill>
+                <a:schemeClr val="accent1"/>
+              </a:solidFill>
+            </a:endParaRPr>
+          </a:p>
+          <a:p>
+            <a:pPr marL="228600" indent="-228600" algn="l">
+              <a:buFont typeface="+mj-lt"/>
+              <a:buAutoNum type="arabicPeriod"/>
+            </a:pPr>
+            <a:endParaRPr lang="en-US" sz="1200" dirty="0">
+              <a:solidFill>
+                <a:schemeClr val="accent1"/>
+              </a:solidFill>
+            </a:endParaRPr>
+          </a:p>
+          <a:p>
+            <a:pPr marL="228600" indent="-228600" algn="l">
+              <a:buFont typeface="+mj-lt"/>
+              <a:buAutoNum type="arabicPeriod"/>
+            </a:pPr>
+            <a:endParaRPr lang="en-US" sz="1200" dirty="0">
+              <a:solidFill>
+                <a:schemeClr val="accent1"/>
+              </a:solidFill>
+            </a:endParaRPr>
+          </a:p>
+          <a:p>
+            <a:pPr marL="228600" indent="-228600" algn="l">
+              <a:buFont typeface="+mj-lt"/>
+              <a:buAutoNum type="arabicPeriod"/>
+            </a:pPr>
+            <a:endParaRPr lang="en-US" sz="1200" dirty="0">
+              <a:solidFill>
+                <a:schemeClr val="accent1"/>
+              </a:solidFill>
+            </a:endParaRPr>
+          </a:p>
+          <a:p>
+            <a:pPr marL="228600" indent="-228600" algn="l">
+              <a:buFont typeface="+mj-lt"/>
+              <a:buAutoNum type="arabicPeriod"/>
+            </a:pPr>
+            <a:endParaRPr lang="en-US" sz="1200" dirty="0">
+              <a:solidFill>
+                <a:schemeClr val="accent1"/>
+              </a:solidFill>
+            </a:endParaRPr>
+          </a:p>
+          <a:p>
+            <a:pPr marL="228600" indent="-228600" algn="l">
+              <a:buFont typeface="+mj-lt"/>
+              <a:buAutoNum type="arabicPeriod"/>
+            </a:pPr>
+            <a:endParaRPr lang="en-US" sz="1200" dirty="0">
+              <a:solidFill>
+                <a:schemeClr val="accent1"/>
+              </a:solidFill>
+            </a:endParaRPr>
+          </a:p>
+          <a:p>
+            <a:pPr algn="l"/>
+            <a:endParaRPr lang="en-US" sz="1200" dirty="0">
+              <a:solidFill>
+                <a:schemeClr val="accent1"/>
+              </a:solidFill>
+            </a:endParaRPr>
           </a:p>
         </p:txBody>
       </p:sp>
     </p:spTree>
     <p:extLst>
       <p:ext uri="{BB962C8B-B14F-4D97-AF65-F5344CB8AC3E}">
-        <p14:creationId xmlns:p14="http://schemas.microsoft.com/office/powerpoint/2010/main" val="3430860990"/>
+        <p14:creationId xmlns:p14="http://schemas.microsoft.com/office/powerpoint/2010/main" val="3105688196"/>
       </p:ext>
     </p:extLst>
   </p:cSld>
   <p:clrMapOvr>
     <a:masterClrMapping/>
   </p:clrMapOvr>
-  <p:timing>
-    <p:tnLst>
-      <p:par>
-        <p:cTn id="1" dur="indefinite" restart="never" nodeType="tmRoot"/>
-      </p:par>
-    </p:tnLst>
-  </p:timing>
 </p:sld>
 </file>
 
@@ -4228,20 +3454,23 @@
         <p:spPr>
           <a:xfrm>
             <a:off x="609600" y="363411"/>
-            <a:ext cx="10972800" cy="935037"/>
+            <a:ext cx="4800600" cy="935037"/>
           </a:xfrm>
         </p:spPr>
         <p:txBody>
           <a:bodyPr>
-            <a:normAutofit fontScale="90000"/>
+            <a:normAutofit/>
           </a:bodyPr>
           <a:lstStyle/>
           <a:p>
             <a:r>
-              <a:rPr lang="en-US" dirty="0" smtClean="0"/>
-              <a:t>Tableau Prep Builder for Compliance</a:t>
-            </a:r>
-            <a:endParaRPr lang="en-US" dirty="0"/>
+              <a:rPr lang="en-US" dirty="0">
+                <a:solidFill>
+                  <a:schemeClr val="accent1"/>
+                </a:solidFill>
+              </a:rPr>
+              <a:t>Data Sources</a:t>
+            </a:r>
           </a:p>
         </p:txBody>
       </p:sp>
@@ -4253,7 +3482,7 @@
         </p:nvSpPr>
         <p:spPr>
           <a:xfrm>
-            <a:off x="609600" y="1554480"/>
+            <a:off x="1295972" y="1554480"/>
             <a:ext cx="2056828" cy="699322"/>
           </a:xfrm>
           <a:prstGeom prst="flowChartMagneticDisk">
@@ -4283,10 +3512,9 @@
           <a:p>
             <a:pPr algn="ctr"/>
             <a:r>
-              <a:rPr lang="en-US" sz="1400" b="1" dirty="0" smtClean="0"/>
+              <a:rPr lang="en-US" sz="1400" b="1" dirty="0"/>
               <a:t>IPS Product Detail</a:t>
             </a:r>
-            <a:endParaRPr lang="en-US" sz="1400" b="1" dirty="0"/>
           </a:p>
         </p:txBody>
       </p:sp>
@@ -4298,7 +3526,7 @@
         </p:nvSpPr>
         <p:spPr>
           <a:xfrm>
-            <a:off x="4267200" y="1554480"/>
+            <a:off x="3930969" y="1554480"/>
             <a:ext cx="2056828" cy="699322"/>
           </a:xfrm>
           <a:prstGeom prst="flowChartMagneticDisk">
@@ -4328,10 +3556,9 @@
           <a:p>
             <a:pPr algn="ctr"/>
             <a:r>
-              <a:rPr lang="en-US" sz="1400" b="1" dirty="0" smtClean="0"/>
+              <a:rPr lang="en-US" sz="1400" b="1" dirty="0"/>
               <a:t>IPS_BILLED_NVD_DATA</a:t>
             </a:r>
-            <a:endParaRPr lang="en-US" sz="1400" b="1" dirty="0"/>
           </a:p>
         </p:txBody>
       </p:sp>
@@ -4343,13 +3570,13 @@
         </p:nvSpPr>
         <p:spPr>
           <a:xfrm>
-            <a:off x="2441448" y="5934456"/>
+            <a:off x="2105217" y="5758520"/>
             <a:ext cx="2740152" cy="699322"/>
           </a:xfrm>
           <a:prstGeom prst="flowChartMagneticDisk">
             <a:avLst/>
           </a:prstGeom>
-          <a:ln w="28575"/>
+          <a:ln/>
         </p:spPr>
         <p:style>
           <a:lnRef idx="2">
@@ -4373,10 +3600,9 @@
           <a:p>
             <a:pPr algn="ctr"/>
             <a:r>
-              <a:rPr lang="en-US" sz="1400" b="1" dirty="0" smtClean="0"/>
+              <a:rPr lang="en-US" sz="1400" b="1" dirty="0"/>
               <a:t>Product Detail + NVD (Clean)</a:t>
             </a:r>
-            <a:endParaRPr lang="en-US" sz="1400" b="1" dirty="0"/>
           </a:p>
         </p:txBody>
       </p:sp>
@@ -4388,8 +3614,8 @@
         </p:nvSpPr>
         <p:spPr>
           <a:xfrm>
-            <a:off x="766286" y="2476306"/>
-            <a:ext cx="1743456" cy="484632"/>
+            <a:off x="1452658" y="2948672"/>
+            <a:ext cx="1743456" cy="256032"/>
           </a:xfrm>
           <a:prstGeom prst="flowChartInternalStorage">
             <a:avLst/>
@@ -4417,10 +3643,9 @@
           <a:lstStyle/>
           <a:p>
             <a:r>
-              <a:rPr lang="en-US" sz="1400" b="1" dirty="0" smtClean="0"/>
+              <a:rPr lang="en-US" sz="1400" b="1" dirty="0"/>
               <a:t>Manufacturer.csv</a:t>
             </a:r>
-            <a:endParaRPr lang="en-US" sz="1400" b="1" dirty="0"/>
           </a:p>
         </p:txBody>
       </p:sp>
@@ -4432,8 +3657,8 @@
         </p:nvSpPr>
         <p:spPr>
           <a:xfrm>
-            <a:off x="766286" y="3048000"/>
-            <a:ext cx="1743456" cy="484632"/>
+            <a:off x="1452658" y="3294996"/>
+            <a:ext cx="1743456" cy="256032"/>
           </a:xfrm>
           <a:prstGeom prst="flowChartInternalStorage">
             <a:avLst/>
@@ -4461,10 +3686,9 @@
           <a:lstStyle/>
           <a:p>
             <a:r>
-              <a:rPr lang="en-US" sz="1400" b="1" dirty="0" smtClean="0"/>
+              <a:rPr lang="en-US" sz="1400" b="1" dirty="0"/>
               <a:t>Distributor.csv</a:t>
             </a:r>
-            <a:endParaRPr lang="en-US" sz="1400" b="1" dirty="0"/>
           </a:p>
         </p:txBody>
       </p:sp>
@@ -4476,8 +3700,8 @@
         </p:nvSpPr>
         <p:spPr>
           <a:xfrm>
-            <a:off x="766286" y="3630168"/>
-            <a:ext cx="1743456" cy="484632"/>
+            <a:off x="1452658" y="3641320"/>
+            <a:ext cx="1743456" cy="256032"/>
           </a:xfrm>
           <a:prstGeom prst="flowChartInternalStorage">
             <a:avLst/>
@@ -4505,10 +3729,9 @@
           <a:lstStyle/>
           <a:p>
             <a:r>
-              <a:rPr lang="en-US" sz="1400" b="1" dirty="0" smtClean="0"/>
+              <a:rPr lang="en-US" sz="1400" b="1" dirty="0"/>
               <a:t>Sector.csv</a:t>
             </a:r>
-            <a:endParaRPr lang="en-US" sz="1400" b="1" dirty="0"/>
           </a:p>
         </p:txBody>
       </p:sp>
@@ -4520,7 +3743,879 @@
         </p:nvSpPr>
         <p:spPr>
           <a:xfrm>
-            <a:off x="609600" y="4495800"/>
+            <a:off x="1295972" y="4495800"/>
+            <a:ext cx="2056828" cy="699322"/>
+          </a:xfrm>
+          <a:prstGeom prst="flowChartMagneticDisk">
+            <a:avLst/>
+          </a:prstGeom>
+          <a:ln/>
+        </p:spPr>
+        <p:style>
+          <a:lnRef idx="2">
+            <a:schemeClr val="accent6">
+              <a:shade val="50000"/>
+            </a:schemeClr>
+          </a:lnRef>
+          <a:fillRef idx="1">
+            <a:schemeClr val="accent6"/>
+          </a:fillRef>
+          <a:effectRef idx="0">
+            <a:schemeClr val="accent6"/>
+          </a:effectRef>
+          <a:fontRef idx="minor">
+            <a:schemeClr val="lt1"/>
+          </a:fontRef>
+        </p:style>
+        <p:txBody>
+          <a:bodyPr rtlCol="0" anchor="ctr"/>
+          <a:lstStyle/>
+          <a:p>
+            <a:pPr algn="ctr"/>
+            <a:r>
+              <a:rPr lang="en-US" sz="1400" b="1" dirty="0"/>
+              <a:t>Product Detail (Clean)</a:t>
+            </a:r>
+          </a:p>
+        </p:txBody>
+      </p:sp>
+      <p:sp>
+        <p:nvSpPr>
+          <p:cNvPr id="13" name="Flowchart: Magnetic Disk 12"/>
+          <p:cNvSpPr/>
+          <p:nvPr/>
+        </p:nvSpPr>
+        <p:spPr>
+          <a:xfrm>
+            <a:off x="3930969" y="4495800"/>
+            <a:ext cx="2056828" cy="699322"/>
+          </a:xfrm>
+          <a:prstGeom prst="flowChartMagneticDisk">
+            <a:avLst/>
+          </a:prstGeom>
+          <a:ln/>
+        </p:spPr>
+        <p:style>
+          <a:lnRef idx="2">
+            <a:schemeClr val="accent6">
+              <a:shade val="50000"/>
+            </a:schemeClr>
+          </a:lnRef>
+          <a:fillRef idx="1">
+            <a:schemeClr val="accent6"/>
+          </a:fillRef>
+          <a:effectRef idx="0">
+            <a:schemeClr val="accent6"/>
+          </a:effectRef>
+          <a:fontRef idx="minor">
+            <a:schemeClr val="lt1"/>
+          </a:fontRef>
+        </p:style>
+        <p:txBody>
+          <a:bodyPr rtlCol="0" anchor="ctr"/>
+          <a:lstStyle/>
+          <a:p>
+            <a:pPr algn="ctr"/>
+            <a:r>
+              <a:rPr lang="en-US" sz="1400" b="1" dirty="0"/>
+              <a:t>Billed NVD (Clean)</a:t>
+            </a:r>
+          </a:p>
+        </p:txBody>
+      </p:sp>
+      <p:sp>
+        <p:nvSpPr>
+          <p:cNvPr id="3" name="Flowchart: Alternate Process 2"/>
+          <p:cNvSpPr/>
+          <p:nvPr/>
+        </p:nvSpPr>
+        <p:spPr>
+          <a:xfrm>
+            <a:off x="7924800" y="1600200"/>
+            <a:ext cx="3657600" cy="876106"/>
+          </a:xfrm>
+          <a:prstGeom prst="flowChartAlternateProcess">
+            <a:avLst/>
+          </a:prstGeom>
+        </p:spPr>
+        <p:style>
+          <a:lnRef idx="1">
+            <a:schemeClr val="accent6"/>
+          </a:lnRef>
+          <a:fillRef idx="2">
+            <a:schemeClr val="accent6"/>
+          </a:fillRef>
+          <a:effectRef idx="1">
+            <a:schemeClr val="accent6"/>
+          </a:effectRef>
+          <a:fontRef idx="minor">
+            <a:schemeClr val="dk1"/>
+          </a:fontRef>
+        </p:style>
+        <p:txBody>
+          <a:bodyPr rtlCol="0" anchor="ctr"/>
+          <a:lstStyle/>
+          <a:p>
+            <a:pPr marL="457200" algn="ctr"/>
+            <a:r>
+              <a:rPr lang="en-US" dirty="0"/>
+              <a:t>Tableau Prep Builder</a:t>
+            </a:r>
+          </a:p>
+          <a:p>
+            <a:pPr marL="457200" algn="ctr"/>
+            <a:r>
+              <a:rPr lang="en-US" dirty="0"/>
+              <a:t>(clean and merge data)</a:t>
+            </a:r>
+          </a:p>
+        </p:txBody>
+      </p:sp>
+      <p:sp>
+        <p:nvSpPr>
+          <p:cNvPr id="24" name="Flowchart: Alternate Process 23"/>
+          <p:cNvSpPr/>
+          <p:nvPr/>
+        </p:nvSpPr>
+        <p:spPr>
+          <a:xfrm>
+            <a:off x="7924800" y="4267200"/>
+            <a:ext cx="3657600" cy="876106"/>
+          </a:xfrm>
+          <a:prstGeom prst="flowChartAlternateProcess">
+            <a:avLst/>
+          </a:prstGeom>
+        </p:spPr>
+        <p:style>
+          <a:lnRef idx="1">
+            <a:schemeClr val="accent6"/>
+          </a:lnRef>
+          <a:fillRef idx="2">
+            <a:schemeClr val="accent6"/>
+          </a:fillRef>
+          <a:effectRef idx="1">
+            <a:schemeClr val="accent6"/>
+          </a:effectRef>
+          <a:fontRef idx="minor">
+            <a:schemeClr val="dk1"/>
+          </a:fontRef>
+        </p:style>
+        <p:txBody>
+          <a:bodyPr rtlCol="0" anchor="ctr"/>
+          <a:lstStyle/>
+          <a:p>
+            <a:pPr marL="457200" algn="ctr"/>
+            <a:r>
+              <a:rPr lang="en-US" dirty="0"/>
+              <a:t>Excel</a:t>
+            </a:r>
+          </a:p>
+          <a:p>
+            <a:pPr marL="457200" algn="ctr"/>
+            <a:r>
+              <a:rPr lang="en-US" dirty="0"/>
+              <a:t>(to modify .csv files)</a:t>
+            </a:r>
+          </a:p>
+        </p:txBody>
+      </p:sp>
+      <p:sp>
+        <p:nvSpPr>
+          <p:cNvPr id="25" name="Flowchart: Alternate Process 24"/>
+          <p:cNvSpPr/>
+          <p:nvPr/>
+        </p:nvSpPr>
+        <p:spPr>
+          <a:xfrm>
+            <a:off x="7924800" y="2852263"/>
+            <a:ext cx="3657600" cy="876106"/>
+          </a:xfrm>
+          <a:prstGeom prst="flowChartAlternateProcess">
+            <a:avLst/>
+          </a:prstGeom>
+        </p:spPr>
+        <p:style>
+          <a:lnRef idx="1">
+            <a:schemeClr val="accent6"/>
+          </a:lnRef>
+          <a:fillRef idx="2">
+            <a:schemeClr val="accent6"/>
+          </a:fillRef>
+          <a:effectRef idx="1">
+            <a:schemeClr val="accent6"/>
+          </a:effectRef>
+          <a:fontRef idx="minor">
+            <a:schemeClr val="dk1"/>
+          </a:fontRef>
+        </p:style>
+        <p:txBody>
+          <a:bodyPr rtlCol="0" anchor="ctr"/>
+          <a:lstStyle/>
+          <a:p>
+            <a:pPr marL="457200" algn="ctr"/>
+            <a:r>
+              <a:rPr lang="en-US" dirty="0"/>
+              <a:t>GitHub desktop</a:t>
+            </a:r>
+          </a:p>
+          <a:p>
+            <a:pPr marL="457200" algn="ctr"/>
+            <a:r>
+              <a:rPr lang="en-US" dirty="0"/>
+              <a:t>(clean and merge data)</a:t>
+            </a:r>
+          </a:p>
+        </p:txBody>
+      </p:sp>
+      <p:sp>
+        <p:nvSpPr>
+          <p:cNvPr id="27" name="Flowchart: Alternate Process 26"/>
+          <p:cNvSpPr/>
+          <p:nvPr/>
+        </p:nvSpPr>
+        <p:spPr>
+          <a:xfrm>
+            <a:off x="7924800" y="5348926"/>
+            <a:ext cx="3657600" cy="876106"/>
+          </a:xfrm>
+          <a:prstGeom prst="flowChartAlternateProcess">
+            <a:avLst/>
+          </a:prstGeom>
+        </p:spPr>
+        <p:style>
+          <a:lnRef idx="1">
+            <a:schemeClr val="accent6"/>
+          </a:lnRef>
+          <a:fillRef idx="2">
+            <a:schemeClr val="accent6"/>
+          </a:fillRef>
+          <a:effectRef idx="1">
+            <a:schemeClr val="accent6"/>
+          </a:effectRef>
+          <a:fontRef idx="minor">
+            <a:schemeClr val="dk1"/>
+          </a:fontRef>
+        </p:style>
+        <p:txBody>
+          <a:bodyPr rtlCol="0" anchor="ctr"/>
+          <a:lstStyle/>
+          <a:p>
+            <a:pPr marL="457200" algn="ctr"/>
+            <a:r>
+              <a:rPr lang="en-US" dirty="0"/>
+              <a:t>Tableau Online</a:t>
+            </a:r>
+          </a:p>
+          <a:p>
+            <a:pPr marL="457200" algn="ctr"/>
+            <a:r>
+              <a:rPr lang="en-US" dirty="0"/>
+              <a:t>(verify files are updated)</a:t>
+            </a:r>
+          </a:p>
+        </p:txBody>
+      </p:sp>
+      <p:pic>
+        <p:nvPicPr>
+          <p:cNvPr id="4" name="Picture 3"/>
+          <p:cNvPicPr>
+            <a:picLocks noChangeAspect="1"/>
+          </p:cNvPicPr>
+          <p:nvPr/>
+        </p:nvPicPr>
+        <p:blipFill rotWithShape="1">
+          <a:blip r:embed="rId2"/>
+          <a:srcRect l="3963" t="5111" r="8341" b="10000"/>
+          <a:stretch/>
+        </p:blipFill>
+        <p:spPr>
+          <a:xfrm>
+            <a:off x="8029012" y="3047999"/>
+            <a:ext cx="657788" cy="545781"/>
+          </a:xfrm>
+          <a:prstGeom prst="rect">
+            <a:avLst/>
+          </a:prstGeom>
+        </p:spPr>
+      </p:pic>
+      <p:pic>
+        <p:nvPicPr>
+          <p:cNvPr id="5" name="Picture 4"/>
+          <p:cNvPicPr>
+            <a:picLocks noChangeAspect="1"/>
+          </p:cNvPicPr>
+          <p:nvPr/>
+        </p:nvPicPr>
+        <p:blipFill>
+          <a:blip r:embed="rId3"/>
+          <a:stretch>
+            <a:fillRect/>
+          </a:stretch>
+        </p:blipFill>
+        <p:spPr>
+          <a:xfrm>
+            <a:off x="8005286" y="1752600"/>
+            <a:ext cx="605314" cy="621243"/>
+          </a:xfrm>
+          <a:prstGeom prst="rect">
+            <a:avLst/>
+          </a:prstGeom>
+        </p:spPr>
+      </p:pic>
+      <p:pic>
+        <p:nvPicPr>
+          <p:cNvPr id="14" name="Picture 13"/>
+          <p:cNvPicPr>
+            <a:picLocks noChangeAspect="1"/>
+          </p:cNvPicPr>
+          <p:nvPr/>
+        </p:nvPicPr>
+        <p:blipFill>
+          <a:blip r:embed="rId4"/>
+          <a:stretch>
+            <a:fillRect/>
+          </a:stretch>
+        </p:blipFill>
+        <p:spPr>
+          <a:xfrm>
+            <a:off x="8077199" y="5486401"/>
+            <a:ext cx="637613" cy="623122"/>
+          </a:xfrm>
+          <a:prstGeom prst="rect">
+            <a:avLst/>
+          </a:prstGeom>
+        </p:spPr>
+      </p:pic>
+      <p:pic>
+        <p:nvPicPr>
+          <p:cNvPr id="19" name="Picture 18"/>
+          <p:cNvPicPr>
+            <a:picLocks noChangeAspect="1"/>
+          </p:cNvPicPr>
+          <p:nvPr/>
+        </p:nvPicPr>
+        <p:blipFill>
+          <a:blip r:embed="rId5"/>
+          <a:stretch>
+            <a:fillRect/>
+          </a:stretch>
+        </p:blipFill>
+        <p:spPr>
+          <a:xfrm>
+            <a:off x="8153400" y="4457700"/>
+            <a:ext cx="514350" cy="504825"/>
+          </a:xfrm>
+          <a:prstGeom prst="rect">
+            <a:avLst/>
+          </a:prstGeom>
+        </p:spPr>
+      </p:pic>
+      <p:sp>
+        <p:nvSpPr>
+          <p:cNvPr id="30" name="Title 1"/>
+          <p:cNvSpPr txBox="1">
+            <a:spLocks/>
+          </p:cNvSpPr>
+          <p:nvPr/>
+        </p:nvSpPr>
+        <p:spPr>
+          <a:xfrm>
+            <a:off x="7086600" y="363411"/>
+            <a:ext cx="4800600" cy="935037"/>
+          </a:xfrm>
+          <a:prstGeom prst="rect">
+            <a:avLst/>
+          </a:prstGeom>
+        </p:spPr>
+        <p:txBody>
+          <a:bodyPr vert="horz" lIns="91440" tIns="45720" rIns="91440" bIns="45720" rtlCol="0" anchor="b">
+            <a:normAutofit/>
+          </a:bodyPr>
+          <a:lstStyle>
+            <a:lvl1pPr algn="ctr" defTabSz="914400" rtl="0" eaLnBrk="1" latinLnBrk="0" hangingPunct="1">
+              <a:lnSpc>
+                <a:spcPct val="90000"/>
+              </a:lnSpc>
+              <a:spcBef>
+                <a:spcPct val="0"/>
+              </a:spcBef>
+              <a:buNone/>
+              <a:defRPr sz="6000" kern="1200">
+                <a:solidFill>
+                  <a:schemeClr val="tx1"/>
+                </a:solidFill>
+                <a:latin typeface="+mj-lt"/>
+                <a:ea typeface="+mj-ea"/>
+                <a:cs typeface="+mj-cs"/>
+              </a:defRPr>
+            </a:lvl1pPr>
+          </a:lstStyle>
+          <a:p>
+            <a:r>
+              <a:rPr lang="en-US" dirty="0">
+                <a:solidFill>
+                  <a:srgbClr val="92D050"/>
+                </a:solidFill>
+              </a:rPr>
+              <a:t>Programs Used</a:t>
+            </a:r>
+          </a:p>
+        </p:txBody>
+      </p:sp>
+      <p:sp>
+        <p:nvSpPr>
+          <p:cNvPr id="32" name="Title 1"/>
+          <p:cNvSpPr txBox="1">
+            <a:spLocks/>
+          </p:cNvSpPr>
+          <p:nvPr/>
+        </p:nvSpPr>
+        <p:spPr>
+          <a:xfrm>
+            <a:off x="105833" y="3078409"/>
+            <a:ext cx="1037167" cy="731591"/>
+          </a:xfrm>
+          <a:prstGeom prst="rect">
+            <a:avLst/>
+          </a:prstGeom>
+        </p:spPr>
+        <p:txBody>
+          <a:bodyPr vert="horz" lIns="91440" tIns="45720" rIns="91440" bIns="45720" rtlCol="0" anchor="b">
+            <a:normAutofit/>
+          </a:bodyPr>
+          <a:lstStyle>
+            <a:lvl1pPr algn="ctr" defTabSz="914400" rtl="0" eaLnBrk="1" latinLnBrk="0" hangingPunct="1">
+              <a:lnSpc>
+                <a:spcPct val="90000"/>
+              </a:lnSpc>
+              <a:spcBef>
+                <a:spcPct val="0"/>
+              </a:spcBef>
+              <a:buNone/>
+              <a:defRPr sz="6000" kern="1200">
+                <a:solidFill>
+                  <a:schemeClr val="tx1"/>
+                </a:solidFill>
+                <a:latin typeface="+mj-lt"/>
+                <a:ea typeface="+mj-ea"/>
+                <a:cs typeface="+mj-cs"/>
+              </a:defRPr>
+            </a:lvl1pPr>
+          </a:lstStyle>
+          <a:p>
+            <a:pPr algn="l"/>
+            <a:r>
+              <a:rPr lang="en-US" sz="1200" dirty="0">
+                <a:solidFill>
+                  <a:schemeClr val="accent1"/>
+                </a:solidFill>
+              </a:rPr>
+              <a:t>Mapping files</a:t>
+            </a:r>
+          </a:p>
+          <a:p>
+            <a:pPr algn="l"/>
+            <a:r>
+              <a:rPr lang="en-US" sz="1200" dirty="0">
+                <a:solidFill>
+                  <a:schemeClr val="accent1"/>
+                </a:solidFill>
+              </a:rPr>
+              <a:t>GitHub </a:t>
+            </a:r>
+          </a:p>
+          <a:p>
+            <a:pPr algn="l"/>
+            <a:r>
+              <a:rPr lang="en-US" sz="1200" dirty="0">
+                <a:solidFill>
+                  <a:schemeClr val="accent1"/>
+                </a:solidFill>
+              </a:rPr>
+              <a:t>repository</a:t>
+            </a:r>
+          </a:p>
+        </p:txBody>
+      </p:sp>
+      <p:sp>
+        <p:nvSpPr>
+          <p:cNvPr id="33" name="Title 1"/>
+          <p:cNvSpPr txBox="1">
+            <a:spLocks/>
+          </p:cNvSpPr>
+          <p:nvPr/>
+        </p:nvSpPr>
+        <p:spPr>
+          <a:xfrm>
+            <a:off x="-38103" y="1731589"/>
+            <a:ext cx="1028703" cy="380846"/>
+          </a:xfrm>
+          <a:prstGeom prst="rect">
+            <a:avLst/>
+          </a:prstGeom>
+        </p:spPr>
+        <p:txBody>
+          <a:bodyPr vert="horz" lIns="91440" tIns="45720" rIns="91440" bIns="45720" rtlCol="0" anchor="b">
+            <a:normAutofit fontScale="92500"/>
+          </a:bodyPr>
+          <a:lstStyle>
+            <a:lvl1pPr algn="ctr" defTabSz="914400" rtl="0" eaLnBrk="1" latinLnBrk="0" hangingPunct="1">
+              <a:lnSpc>
+                <a:spcPct val="90000"/>
+              </a:lnSpc>
+              <a:spcBef>
+                <a:spcPct val="0"/>
+              </a:spcBef>
+              <a:buNone/>
+              <a:defRPr sz="6000" kern="1200">
+                <a:solidFill>
+                  <a:schemeClr val="tx1"/>
+                </a:solidFill>
+                <a:latin typeface="+mj-lt"/>
+                <a:ea typeface="+mj-ea"/>
+                <a:cs typeface="+mj-cs"/>
+              </a:defRPr>
+            </a:lvl1pPr>
+          </a:lstStyle>
+          <a:p>
+            <a:pPr algn="l"/>
+            <a:r>
+              <a:rPr lang="en-US" sz="1200" dirty="0">
+                <a:solidFill>
+                  <a:schemeClr val="accent1"/>
+                </a:solidFill>
+              </a:rPr>
+              <a:t>Tableau Online</a:t>
+            </a:r>
+          </a:p>
+        </p:txBody>
+      </p:sp>
+      <p:sp>
+        <p:nvSpPr>
+          <p:cNvPr id="28" name="Left Brace 27"/>
+          <p:cNvSpPr/>
+          <p:nvPr/>
+        </p:nvSpPr>
+        <p:spPr>
+          <a:xfrm>
+            <a:off x="952500" y="1513526"/>
+            <a:ext cx="228600" cy="962780"/>
+          </a:xfrm>
+          <a:prstGeom prst="leftBrace">
+            <a:avLst/>
+          </a:prstGeom>
+          <a:ln>
+            <a:solidFill>
+              <a:schemeClr val="accent1">
+                <a:lumMod val="40000"/>
+                <a:lumOff val="60000"/>
+              </a:schemeClr>
+            </a:solidFill>
+          </a:ln>
+        </p:spPr>
+        <p:style>
+          <a:lnRef idx="1">
+            <a:schemeClr val="accent1"/>
+          </a:lnRef>
+          <a:fillRef idx="0">
+            <a:schemeClr val="accent1"/>
+          </a:fillRef>
+          <a:effectRef idx="0">
+            <a:schemeClr val="accent1"/>
+          </a:effectRef>
+          <a:fontRef idx="minor">
+            <a:schemeClr val="tx1"/>
+          </a:fontRef>
+        </p:style>
+        <p:txBody>
+          <a:bodyPr rtlCol="0" anchor="ctr"/>
+          <a:lstStyle/>
+          <a:p>
+            <a:pPr algn="ctr"/>
+            <a:endParaRPr lang="en-US"/>
+          </a:p>
+        </p:txBody>
+      </p:sp>
+      <p:sp>
+        <p:nvSpPr>
+          <p:cNvPr id="35" name="Left Brace 34"/>
+          <p:cNvSpPr/>
+          <p:nvPr/>
+        </p:nvSpPr>
+        <p:spPr>
+          <a:xfrm>
+            <a:off x="952500" y="2969211"/>
+            <a:ext cx="228600" cy="962780"/>
+          </a:xfrm>
+          <a:prstGeom prst="leftBrace">
+            <a:avLst/>
+          </a:prstGeom>
+          <a:ln>
+            <a:solidFill>
+              <a:schemeClr val="accent1">
+                <a:lumMod val="40000"/>
+                <a:lumOff val="60000"/>
+              </a:schemeClr>
+            </a:solidFill>
+          </a:ln>
+        </p:spPr>
+        <p:style>
+          <a:lnRef idx="1">
+            <a:schemeClr val="accent1"/>
+          </a:lnRef>
+          <a:fillRef idx="0">
+            <a:schemeClr val="accent1"/>
+          </a:fillRef>
+          <a:effectRef idx="0">
+            <a:schemeClr val="accent1"/>
+          </a:effectRef>
+          <a:fontRef idx="minor">
+            <a:schemeClr val="tx1"/>
+          </a:fontRef>
+        </p:style>
+        <p:txBody>
+          <a:bodyPr rtlCol="0" anchor="ctr"/>
+          <a:lstStyle/>
+          <a:p>
+            <a:pPr algn="ctr"/>
+            <a:endParaRPr lang="en-US"/>
+          </a:p>
+        </p:txBody>
+      </p:sp>
+      <p:sp>
+        <p:nvSpPr>
+          <p:cNvPr id="36" name="Left Brace 35"/>
+          <p:cNvSpPr/>
+          <p:nvPr/>
+        </p:nvSpPr>
+        <p:spPr>
+          <a:xfrm>
+            <a:off x="952500" y="4473858"/>
+            <a:ext cx="228600" cy="1698342"/>
+          </a:xfrm>
+          <a:prstGeom prst="leftBrace">
+            <a:avLst/>
+          </a:prstGeom>
+          <a:ln>
+            <a:solidFill>
+              <a:schemeClr val="accent1">
+                <a:lumMod val="40000"/>
+                <a:lumOff val="60000"/>
+              </a:schemeClr>
+            </a:solidFill>
+          </a:ln>
+        </p:spPr>
+        <p:style>
+          <a:lnRef idx="1">
+            <a:schemeClr val="accent1"/>
+          </a:lnRef>
+          <a:fillRef idx="0">
+            <a:schemeClr val="accent1"/>
+          </a:fillRef>
+          <a:effectRef idx="0">
+            <a:schemeClr val="accent1"/>
+          </a:effectRef>
+          <a:fontRef idx="minor">
+            <a:schemeClr val="tx1"/>
+          </a:fontRef>
+        </p:style>
+        <p:txBody>
+          <a:bodyPr rtlCol="0" anchor="ctr"/>
+          <a:lstStyle/>
+          <a:p>
+            <a:pPr algn="ctr"/>
+            <a:endParaRPr lang="en-US"/>
+          </a:p>
+        </p:txBody>
+      </p:sp>
+      <p:sp>
+        <p:nvSpPr>
+          <p:cNvPr id="37" name="Title 1"/>
+          <p:cNvSpPr txBox="1">
+            <a:spLocks/>
+          </p:cNvSpPr>
+          <p:nvPr/>
+        </p:nvSpPr>
+        <p:spPr>
+          <a:xfrm>
+            <a:off x="-38103" y="5054754"/>
+            <a:ext cx="1028703" cy="380846"/>
+          </a:xfrm>
+          <a:prstGeom prst="rect">
+            <a:avLst/>
+          </a:prstGeom>
+        </p:spPr>
+        <p:txBody>
+          <a:bodyPr vert="horz" lIns="91440" tIns="45720" rIns="91440" bIns="45720" rtlCol="0" anchor="b">
+            <a:normAutofit fontScale="92500"/>
+          </a:bodyPr>
+          <a:lstStyle>
+            <a:lvl1pPr algn="ctr" defTabSz="914400" rtl="0" eaLnBrk="1" latinLnBrk="0" hangingPunct="1">
+              <a:lnSpc>
+                <a:spcPct val="90000"/>
+              </a:lnSpc>
+              <a:spcBef>
+                <a:spcPct val="0"/>
+              </a:spcBef>
+              <a:buNone/>
+              <a:defRPr sz="6000" kern="1200">
+                <a:solidFill>
+                  <a:schemeClr val="tx1"/>
+                </a:solidFill>
+                <a:latin typeface="+mj-lt"/>
+                <a:ea typeface="+mj-ea"/>
+                <a:cs typeface="+mj-cs"/>
+              </a:defRPr>
+            </a:lvl1pPr>
+          </a:lstStyle>
+          <a:p>
+            <a:pPr algn="l"/>
+            <a:r>
+              <a:rPr lang="en-US" sz="1200" dirty="0">
+                <a:solidFill>
+                  <a:schemeClr val="accent1"/>
+                </a:solidFill>
+              </a:rPr>
+              <a:t>Tableau Online</a:t>
+            </a:r>
+          </a:p>
+        </p:txBody>
+      </p:sp>
+      <p:cxnSp>
+        <p:nvCxnSpPr>
+          <p:cNvPr id="38" name="Straight Arrow Connector 37"/>
+          <p:cNvCxnSpPr>
+            <a:stCxn id="6" idx="3"/>
+            <a:endCxn id="12" idx="1"/>
+          </p:cNvCxnSpPr>
+          <p:nvPr/>
+        </p:nvCxnSpPr>
+        <p:spPr>
+          <a:xfrm>
+            <a:off x="2324386" y="2253802"/>
+            <a:ext cx="0" cy="2241998"/>
+          </a:xfrm>
+          <a:prstGeom prst="straightConnector1">
+            <a:avLst/>
+          </a:prstGeom>
+          <a:ln w="25400">
+            <a:tailEnd type="triangle" w="lg" len="lg"/>
+          </a:ln>
+        </p:spPr>
+        <p:style>
+          <a:lnRef idx="1">
+            <a:schemeClr val="accent1"/>
+          </a:lnRef>
+          <a:fillRef idx="0">
+            <a:schemeClr val="accent1"/>
+          </a:fillRef>
+          <a:effectRef idx="0">
+            <a:schemeClr val="accent1"/>
+          </a:effectRef>
+          <a:fontRef idx="minor">
+            <a:schemeClr val="tx1"/>
+          </a:fontRef>
+        </p:style>
+      </p:cxnSp>
+      <p:sp>
+        <p:nvSpPr>
+          <p:cNvPr id="39" name="TextBox 38"/>
+          <p:cNvSpPr txBox="1"/>
+          <p:nvPr/>
+        </p:nvSpPr>
+        <p:spPr>
+          <a:xfrm>
+            <a:off x="1828800" y="2411361"/>
+            <a:ext cx="1125693" cy="307777"/>
+          </a:xfrm>
+          <a:prstGeom prst="rect">
+            <a:avLst/>
+          </a:prstGeom>
+          <a:solidFill>
+            <a:schemeClr val="bg1"/>
+          </a:solidFill>
+        </p:spPr>
+        <p:txBody>
+          <a:bodyPr wrap="none" rtlCol="0">
+            <a:spAutoFit/>
+          </a:bodyPr>
+          <a:lstStyle/>
+          <a:p>
+            <a:r>
+              <a:rPr lang="en-US" sz="1400" dirty="0"/>
+              <a:t>Remap fields</a:t>
+            </a:r>
+          </a:p>
+        </p:txBody>
+      </p:sp>
+    </p:spTree>
+    <p:extLst>
+      <p:ext uri="{BB962C8B-B14F-4D97-AF65-F5344CB8AC3E}">
+        <p14:creationId xmlns:p14="http://schemas.microsoft.com/office/powerpoint/2010/main" val="3430860990"/>
+      </p:ext>
+    </p:extLst>
+  </p:cSld>
+  <p:clrMapOvr>
+    <a:masterClrMapping/>
+  </p:clrMapOvr>
+</p:sld>
+</file>
+
+<file path=ppt/slides/slide4.xml><?xml version="1.0" encoding="utf-8"?>
+<p:sld xmlns:a="http://schemas.openxmlformats.org/drawingml/2006/main" xmlns:r="http://schemas.openxmlformats.org/officeDocument/2006/relationships" xmlns:p="http://schemas.openxmlformats.org/presentationml/2006/main">
+  <p:cSld>
+    <p:spTree>
+      <p:nvGrpSpPr>
+        <p:cNvPr id="1" name=""/>
+        <p:cNvGrpSpPr/>
+        <p:nvPr/>
+      </p:nvGrpSpPr>
+      <p:grpSpPr>
+        <a:xfrm>
+          <a:off x="0" y="0"/>
+          <a:ext cx="0" cy="0"/>
+          <a:chOff x="0" y="0"/>
+          <a:chExt cx="0" cy="0"/>
+        </a:xfrm>
+      </p:grpSpPr>
+      <p:sp>
+        <p:nvSpPr>
+          <p:cNvPr id="2" name="Title 1"/>
+          <p:cNvSpPr>
+            <a:spLocks noGrp="1"/>
+          </p:cNvSpPr>
+          <p:nvPr>
+            <p:ph type="ctrTitle"/>
+          </p:nvPr>
+        </p:nvSpPr>
+        <p:spPr>
+          <a:xfrm>
+            <a:off x="609600" y="363411"/>
+            <a:ext cx="10972800" cy="935037"/>
+          </a:xfrm>
+        </p:spPr>
+        <p:txBody>
+          <a:bodyPr>
+            <a:normAutofit fontScale="90000"/>
+          </a:bodyPr>
+          <a:lstStyle/>
+          <a:p>
+            <a:r>
+              <a:rPr lang="en-US" dirty="0"/>
+              <a:t>Tableau Prep Builder for Compliance</a:t>
+            </a:r>
+          </a:p>
+        </p:txBody>
+      </p:sp>
+      <p:sp>
+        <p:nvSpPr>
+          <p:cNvPr id="6" name="Flowchart: Magnetic Disk 5"/>
+          <p:cNvSpPr/>
+          <p:nvPr/>
+        </p:nvSpPr>
+        <p:spPr>
+          <a:xfrm>
+            <a:off x="609600" y="1554480"/>
             <a:ext cx="2056828" cy="699322"/>
           </a:xfrm>
           <a:prstGeom prst="flowChartMagneticDisk">
@@ -4550,22 +4645,21 @@
           <a:p>
             <a:pPr algn="ctr"/>
             <a:r>
-              <a:rPr lang="en-US" sz="1400" b="1" dirty="0" smtClean="0"/>
-              <a:t>Product Detail (Clean)</a:t>
-            </a:r>
-            <a:endParaRPr lang="en-US" sz="1400" b="1" dirty="0"/>
-          </a:p>
-        </p:txBody>
-      </p:sp>
-      <p:sp>
-        <p:nvSpPr>
-          <p:cNvPr id="13" name="Flowchart: Magnetic Disk 12"/>
+              <a:rPr lang="en-US" sz="1400" b="1" dirty="0"/>
+              <a:t>IPS Product Detail</a:t>
+            </a:r>
+          </a:p>
+        </p:txBody>
+      </p:sp>
+      <p:sp>
+        <p:nvSpPr>
+          <p:cNvPr id="7" name="Flowchart: Magnetic Disk 6"/>
           <p:cNvSpPr/>
           <p:nvPr/>
         </p:nvSpPr>
         <p:spPr>
           <a:xfrm>
-            <a:off x="4267200" y="4495800"/>
+            <a:off x="4267200" y="1554480"/>
             <a:ext cx="2056828" cy="699322"/>
           </a:xfrm>
           <a:prstGeom prst="flowChartMagneticDisk">
@@ -4595,27 +4689,71 @@
           <a:p>
             <a:pPr algn="ctr"/>
             <a:r>
-              <a:rPr lang="en-US" sz="1400" b="1" dirty="0" smtClean="0"/>
-              <a:t>Billed NVD (Clean)</a:t>
-            </a:r>
-            <a:endParaRPr lang="en-US" sz="1400" b="1" dirty="0"/>
-          </a:p>
-        </p:txBody>
-      </p:sp>
-      <p:sp>
-        <p:nvSpPr>
-          <p:cNvPr id="15" name="Flowchart: Terminator 14"/>
+              <a:rPr lang="en-US" sz="1400" b="1" dirty="0"/>
+              <a:t>IPS_BILLED_NVD_DATA</a:t>
+            </a:r>
+          </a:p>
+        </p:txBody>
+      </p:sp>
+      <p:sp>
+        <p:nvSpPr>
+          <p:cNvPr id="8" name="Flowchart: Magnetic Disk 7"/>
           <p:cNvSpPr/>
           <p:nvPr/>
         </p:nvSpPr>
         <p:spPr>
           <a:xfrm>
-            <a:off x="7086600" y="1593402"/>
-            <a:ext cx="838200" cy="609600"/>
-          </a:xfrm>
-          <a:prstGeom prst="flowChartTerminator">
+            <a:off x="2441448" y="5934456"/>
+            <a:ext cx="2740152" cy="699322"/>
+          </a:xfrm>
+          <a:prstGeom prst="flowChartMagneticDisk">
             <a:avLst/>
           </a:prstGeom>
+          <a:ln w="28575"/>
+        </p:spPr>
+        <p:style>
+          <a:lnRef idx="2">
+            <a:schemeClr val="accent6">
+              <a:shade val="50000"/>
+            </a:schemeClr>
+          </a:lnRef>
+          <a:fillRef idx="1">
+            <a:schemeClr val="accent6"/>
+          </a:fillRef>
+          <a:effectRef idx="0">
+            <a:schemeClr val="accent6"/>
+          </a:effectRef>
+          <a:fontRef idx="minor">
+            <a:schemeClr val="lt1"/>
+          </a:fontRef>
+        </p:style>
+        <p:txBody>
+          <a:bodyPr rtlCol="0" anchor="ctr"/>
+          <a:lstStyle/>
+          <a:p>
+            <a:pPr algn="ctr"/>
+            <a:r>
+              <a:rPr lang="en-US" sz="1400" b="1" dirty="0"/>
+              <a:t>Product Detail + NVD (Clean)</a:t>
+            </a:r>
+          </a:p>
+        </p:txBody>
+      </p:sp>
+      <p:sp>
+        <p:nvSpPr>
+          <p:cNvPr id="9" name="Flowchart: Internal Storage 8"/>
+          <p:cNvSpPr/>
+          <p:nvPr/>
+        </p:nvSpPr>
+        <p:spPr>
+          <a:xfrm>
+            <a:off x="766286" y="2476306"/>
+            <a:ext cx="1743456" cy="484632"/>
+          </a:xfrm>
+          <a:prstGeom prst="flowChartInternalStorage">
+            <a:avLst/>
+          </a:prstGeom>
+          <a:ln w="28575"/>
         </p:spPr>
         <p:style>
           <a:lnRef idx="2">
@@ -4637,29 +4775,28 @@
           <a:bodyPr rtlCol="0" anchor="ctr"/>
           <a:lstStyle/>
           <a:p>
-            <a:pPr algn="ctr"/>
-            <a:r>
-              <a:rPr lang="en-US" dirty="0" smtClean="0"/>
-              <a:t>START</a:t>
-            </a:r>
-            <a:endParaRPr lang="en-US" dirty="0"/>
-          </a:p>
-        </p:txBody>
-      </p:sp>
-      <p:sp>
-        <p:nvSpPr>
-          <p:cNvPr id="16" name="Flowchart: Process 15"/>
+            <a:r>
+              <a:rPr lang="en-US" sz="1400" b="1" dirty="0"/>
+              <a:t>Manufacturer.csv</a:t>
+            </a:r>
+          </a:p>
+        </p:txBody>
+      </p:sp>
+      <p:sp>
+        <p:nvSpPr>
+          <p:cNvPr id="10" name="Flowchart: Internal Storage 9"/>
           <p:cNvSpPr/>
           <p:nvPr/>
         </p:nvSpPr>
         <p:spPr>
           <a:xfrm>
-            <a:off x="7660188" y="3430160"/>
-            <a:ext cx="3204576" cy="581466"/>
-          </a:xfrm>
-          <a:prstGeom prst="flowChartProcess">
+            <a:off x="766286" y="3048000"/>
+            <a:ext cx="1743456" cy="484632"/>
+          </a:xfrm>
+          <a:prstGeom prst="flowChartInternalStorage">
             <a:avLst/>
           </a:prstGeom>
+          <a:ln w="28575"/>
         </p:spPr>
         <p:style>
           <a:lnRef idx="2">
@@ -4681,43 +4818,28 @@
           <a:bodyPr rtlCol="0" anchor="ctr"/>
           <a:lstStyle/>
           <a:p>
-            <a:pPr algn="ctr"/>
-            <a:r>
-              <a:rPr lang="en-US" dirty="0" smtClean="0"/>
-              <a:t>Modify .csv files </a:t>
-            </a:r>
-          </a:p>
-          <a:p>
-            <a:pPr algn="ctr"/>
-            <a:r>
-              <a:rPr lang="en-US" sz="1200" dirty="0" smtClean="0"/>
-              <a:t>Documents&gt;GitHub&gt;</a:t>
-            </a:r>
-            <a:r>
-              <a:rPr lang="en-US" sz="1200" dirty="0" err="1" smtClean="0"/>
-              <a:t>TerikoTableau</a:t>
-            </a:r>
-            <a:r>
-              <a:rPr lang="en-US" sz="1200" dirty="0" smtClean="0"/>
-              <a:t>&gt;Prep Flows</a:t>
-            </a:r>
-          </a:p>
-        </p:txBody>
-      </p:sp>
-      <p:sp>
-        <p:nvSpPr>
-          <p:cNvPr id="17" name="Flowchart: Decision 16"/>
+            <a:r>
+              <a:rPr lang="en-US" sz="1400" b="1" dirty="0"/>
+              <a:t>Distributor.csv</a:t>
+            </a:r>
+          </a:p>
+        </p:txBody>
+      </p:sp>
+      <p:sp>
+        <p:nvSpPr>
+          <p:cNvPr id="11" name="Flowchart: Internal Storage 10"/>
           <p:cNvSpPr/>
           <p:nvPr/>
         </p:nvSpPr>
         <p:spPr>
           <a:xfrm>
-            <a:off x="8386176" y="1132223"/>
-            <a:ext cx="1752600" cy="1522814"/>
-          </a:xfrm>
-          <a:prstGeom prst="flowChartDecision">
+            <a:off x="766286" y="3630168"/>
+            <a:ext cx="1743456" cy="484632"/>
+          </a:xfrm>
+          <a:prstGeom prst="flowChartInternalStorage">
             <a:avLst/>
           </a:prstGeom>
+          <a:ln w="28575"/>
         </p:spPr>
         <p:style>
           <a:lnRef idx="2">
@@ -4739,37 +4861,28 @@
           <a:bodyPr rtlCol="0" anchor="ctr"/>
           <a:lstStyle/>
           <a:p>
-            <a:pPr algn="ctr"/>
-            <a:r>
-              <a:rPr lang="en-US" sz="1400" b="1" dirty="0" smtClean="0"/>
-              <a:t>Update</a:t>
-            </a:r>
-            <a:r>
-              <a:rPr lang="en-US" sz="1400" dirty="0" smtClean="0"/>
-              <a:t> </a:t>
-            </a:r>
-            <a:r>
-              <a:rPr lang="en-US" sz="1400" b="1" dirty="0" smtClean="0"/>
-              <a:t>mapping?</a:t>
-            </a:r>
-            <a:endParaRPr lang="en-US" sz="1400" b="1" dirty="0"/>
-          </a:p>
-        </p:txBody>
-      </p:sp>
-      <p:sp>
-        <p:nvSpPr>
-          <p:cNvPr id="18" name="Flowchart: Process 17"/>
+            <a:r>
+              <a:rPr lang="en-US" sz="1400" b="1" dirty="0"/>
+              <a:t>Sector.csv</a:t>
+            </a:r>
+          </a:p>
+        </p:txBody>
+      </p:sp>
+      <p:sp>
+        <p:nvSpPr>
+          <p:cNvPr id="12" name="Flowchart: Magnetic Disk 11"/>
           <p:cNvSpPr/>
           <p:nvPr/>
         </p:nvSpPr>
         <p:spPr>
           <a:xfrm>
-            <a:off x="11201400" y="3852164"/>
-            <a:ext cx="2362200" cy="810768"/>
-          </a:xfrm>
-          <a:prstGeom prst="flowChartProcess">
+            <a:off x="609600" y="4495800"/>
+            <a:ext cx="2056828" cy="699322"/>
+          </a:xfrm>
+          <a:prstGeom prst="flowChartMagneticDisk">
             <a:avLst/>
           </a:prstGeom>
+          <a:ln w="28575"/>
         </p:spPr>
         <p:style>
           <a:lnRef idx="2">
@@ -4793,223 +4906,27 @@
           <a:p>
             <a:pPr algn="ctr"/>
             <a:r>
-              <a:rPr lang="en-US" dirty="0" smtClean="0"/>
-              <a:t>Open these apps</a:t>
-            </a:r>
-          </a:p>
-          <a:p>
-            <a:pPr marL="285750" indent="-285750">
-              <a:buFont typeface="Arial" panose="020B0604020202020204" pitchFamily="34" charset="0"/>
-              <a:buChar char="•"/>
-            </a:pPr>
-            <a:r>
-              <a:rPr lang="en-US" dirty="0" err="1" smtClean="0"/>
-              <a:t>Github</a:t>
-            </a:r>
-            <a:endParaRPr lang="en-US" dirty="0" smtClean="0"/>
-          </a:p>
-          <a:p>
-            <a:pPr marL="285750" indent="-285750">
-              <a:buFont typeface="Arial" panose="020B0604020202020204" pitchFamily="34" charset="0"/>
-              <a:buChar char="•"/>
-            </a:pPr>
-            <a:r>
-              <a:rPr lang="en-US" dirty="0" smtClean="0"/>
-              <a:t>Tableau Prep </a:t>
-            </a:r>
-            <a:r>
-              <a:rPr lang="en-US" dirty="0" err="1" smtClean="0"/>
-              <a:t>Buider</a:t>
-            </a:r>
-            <a:endParaRPr lang="en-US" dirty="0"/>
-          </a:p>
-        </p:txBody>
-      </p:sp>
-      <p:cxnSp>
-        <p:nvCxnSpPr>
-          <p:cNvPr id="20" name="Straight Arrow Connector 19"/>
-          <p:cNvCxnSpPr>
-            <a:stCxn id="17" idx="2"/>
-            <a:endCxn id="16" idx="0"/>
-          </p:cNvCxnSpPr>
+              <a:rPr lang="en-US" sz="1400" b="1" dirty="0"/>
+              <a:t>Product Detail (Clean)</a:t>
+            </a:r>
+          </a:p>
+        </p:txBody>
+      </p:sp>
+      <p:sp>
+        <p:nvSpPr>
+          <p:cNvPr id="13" name="Flowchart: Magnetic Disk 12"/>
+          <p:cNvSpPr/>
           <p:nvPr/>
-        </p:nvCxnSpPr>
-        <p:spPr>
-          <a:xfrm>
-            <a:off x="9262476" y="2655037"/>
-            <a:ext cx="0" cy="775123"/>
-          </a:xfrm>
-          <a:prstGeom prst="straightConnector1">
+        </p:nvSpPr>
+        <p:spPr>
+          <a:xfrm>
+            <a:off x="4267200" y="4495800"/>
+            <a:ext cx="2056828" cy="699322"/>
+          </a:xfrm>
+          <a:prstGeom prst="flowChartMagneticDisk">
             <a:avLst/>
           </a:prstGeom>
-          <a:ln w="25400">
-            <a:tailEnd type="triangle" w="lg" len="lg"/>
-          </a:ln>
-        </p:spPr>
-        <p:style>
-          <a:lnRef idx="1">
-            <a:schemeClr val="accent1"/>
-          </a:lnRef>
-          <a:fillRef idx="0">
-            <a:schemeClr val="accent1"/>
-          </a:fillRef>
-          <a:effectRef idx="0">
-            <a:schemeClr val="accent1"/>
-          </a:effectRef>
-          <a:fontRef idx="minor">
-            <a:schemeClr val="tx1"/>
-          </a:fontRef>
-        </p:style>
-      </p:cxnSp>
-      <p:sp>
-        <p:nvSpPr>
-          <p:cNvPr id="21" name="TextBox 20"/>
-          <p:cNvSpPr txBox="1"/>
-          <p:nvPr/>
-        </p:nvSpPr>
-        <p:spPr>
-          <a:xfrm>
-            <a:off x="9037320" y="2754868"/>
-            <a:ext cx="420243" cy="307777"/>
-          </a:xfrm>
-          <a:prstGeom prst="rect">
-            <a:avLst/>
-          </a:prstGeom>
-          <a:solidFill>
-            <a:schemeClr val="bg1"/>
-          </a:solidFill>
-        </p:spPr>
-        <p:txBody>
-          <a:bodyPr wrap="none" rtlCol="0">
-            <a:spAutoFit/>
-          </a:bodyPr>
-          <a:lstStyle/>
-          <a:p>
-            <a:r>
-              <a:rPr lang="en-US" sz="1400" dirty="0" smtClean="0"/>
-              <a:t>Yes</a:t>
-            </a:r>
-            <a:endParaRPr lang="en-US" sz="1400" dirty="0"/>
-          </a:p>
-        </p:txBody>
-      </p:sp>
-      <p:cxnSp>
-        <p:nvCxnSpPr>
-          <p:cNvPr id="26" name="Straight Arrow Connector 25"/>
-          <p:cNvCxnSpPr>
-            <a:stCxn id="17" idx="3"/>
-          </p:cNvCxnSpPr>
-          <p:nvPr/>
-        </p:nvCxnSpPr>
-        <p:spPr>
-          <a:xfrm>
-            <a:off x="10138776" y="1893630"/>
-            <a:ext cx="1062624" cy="0"/>
-          </a:xfrm>
-          <a:prstGeom prst="straightConnector1">
-            <a:avLst/>
-          </a:prstGeom>
-          <a:ln w="25400">
-            <a:tailEnd type="triangle" w="lg" len="lg"/>
-          </a:ln>
-        </p:spPr>
-        <p:style>
-          <a:lnRef idx="1">
-            <a:schemeClr val="accent1"/>
-          </a:lnRef>
-          <a:fillRef idx="0">
-            <a:schemeClr val="accent1"/>
-          </a:fillRef>
-          <a:effectRef idx="0">
-            <a:schemeClr val="accent1"/>
-          </a:effectRef>
-          <a:fontRef idx="minor">
-            <a:schemeClr val="tx1"/>
-          </a:fontRef>
-        </p:style>
-      </p:cxnSp>
-      <p:sp>
-        <p:nvSpPr>
-          <p:cNvPr id="23" name="TextBox 22"/>
-          <p:cNvSpPr txBox="1"/>
-          <p:nvPr/>
-        </p:nvSpPr>
-        <p:spPr>
-          <a:xfrm>
-            <a:off x="10445202" y="1708802"/>
-            <a:ext cx="394660" cy="307777"/>
-          </a:xfrm>
-          <a:prstGeom prst="rect">
-            <a:avLst/>
-          </a:prstGeom>
-          <a:solidFill>
-            <a:schemeClr val="bg1"/>
-          </a:solidFill>
-        </p:spPr>
-        <p:txBody>
-          <a:bodyPr wrap="none" rtlCol="0">
-            <a:spAutoFit/>
-          </a:bodyPr>
-          <a:lstStyle/>
-          <a:p>
-            <a:r>
-              <a:rPr lang="en-US" sz="1400" dirty="0" smtClean="0"/>
-              <a:t>No</a:t>
-            </a:r>
-            <a:endParaRPr lang="en-US" sz="1400" dirty="0"/>
-          </a:p>
-        </p:txBody>
-      </p:sp>
-      <p:cxnSp>
-        <p:nvCxnSpPr>
-          <p:cNvPr id="31" name="Straight Arrow Connector 30"/>
-          <p:cNvCxnSpPr>
-            <a:stCxn id="15" idx="3"/>
-            <a:endCxn id="17" idx="1"/>
-          </p:cNvCxnSpPr>
-          <p:nvPr/>
-        </p:nvCxnSpPr>
-        <p:spPr>
-          <a:xfrm flipV="1">
-            <a:off x="7924800" y="1893630"/>
-            <a:ext cx="461376" cy="4572"/>
-          </a:xfrm>
-          <a:prstGeom prst="straightConnector1">
-            <a:avLst/>
-          </a:prstGeom>
-          <a:ln w="25400">
-            <a:tailEnd type="triangle" w="lg" len="lg"/>
-          </a:ln>
-        </p:spPr>
-        <p:style>
-          <a:lnRef idx="1">
-            <a:schemeClr val="accent1"/>
-          </a:lnRef>
-          <a:fillRef idx="0">
-            <a:schemeClr val="accent1"/>
-          </a:fillRef>
-          <a:effectRef idx="0">
-            <a:schemeClr val="accent1"/>
-          </a:effectRef>
-          <a:fontRef idx="minor">
-            <a:schemeClr val="tx1"/>
-          </a:fontRef>
-        </p:style>
-      </p:cxnSp>
-      <p:sp>
-        <p:nvSpPr>
-          <p:cNvPr id="52" name="Flowchart: Process 51"/>
-          <p:cNvSpPr/>
-          <p:nvPr/>
-        </p:nvSpPr>
-        <p:spPr>
-          <a:xfrm>
-            <a:off x="7660188" y="4336595"/>
-            <a:ext cx="3204576" cy="581466"/>
-          </a:xfrm>
-          <a:prstGeom prst="flowChartProcess">
-            <a:avLst/>
-          </a:prstGeom>
+          <a:ln w="28575"/>
         </p:spPr>
         <p:style>
           <a:lnRef idx="2">
@@ -5033,22 +4950,455 @@
           <a:p>
             <a:pPr algn="ctr"/>
             <a:r>
-              <a:rPr lang="en-US" dirty="0" smtClean="0"/>
+              <a:rPr lang="en-US" sz="1400" b="1" dirty="0"/>
+              <a:t>Billed NVD (Clean)</a:t>
+            </a:r>
+          </a:p>
+        </p:txBody>
+      </p:sp>
+      <p:sp>
+        <p:nvSpPr>
+          <p:cNvPr id="15" name="Flowchart: Terminator 14"/>
+          <p:cNvSpPr/>
+          <p:nvPr/>
+        </p:nvSpPr>
+        <p:spPr>
+          <a:xfrm>
+            <a:off x="7086600" y="1593402"/>
+            <a:ext cx="838200" cy="609600"/>
+          </a:xfrm>
+          <a:prstGeom prst="flowChartTerminator">
+            <a:avLst/>
+          </a:prstGeom>
+        </p:spPr>
+        <p:style>
+          <a:lnRef idx="2">
+            <a:schemeClr val="accent1">
+              <a:shade val="50000"/>
+            </a:schemeClr>
+          </a:lnRef>
+          <a:fillRef idx="1">
+            <a:schemeClr val="accent1"/>
+          </a:fillRef>
+          <a:effectRef idx="0">
+            <a:schemeClr val="accent1"/>
+          </a:effectRef>
+          <a:fontRef idx="minor">
+            <a:schemeClr val="lt1"/>
+          </a:fontRef>
+        </p:style>
+        <p:txBody>
+          <a:bodyPr rtlCol="0" anchor="ctr"/>
+          <a:lstStyle/>
+          <a:p>
+            <a:pPr algn="ctr"/>
+            <a:r>
+              <a:rPr lang="en-US" dirty="0"/>
+              <a:t>START</a:t>
+            </a:r>
+          </a:p>
+        </p:txBody>
+      </p:sp>
+      <p:sp>
+        <p:nvSpPr>
+          <p:cNvPr id="16" name="Flowchart: Process 15"/>
+          <p:cNvSpPr/>
+          <p:nvPr/>
+        </p:nvSpPr>
+        <p:spPr>
+          <a:xfrm>
+            <a:off x="7660188" y="3430160"/>
+            <a:ext cx="3204576" cy="581466"/>
+          </a:xfrm>
+          <a:prstGeom prst="flowChartProcess">
+            <a:avLst/>
+          </a:prstGeom>
+        </p:spPr>
+        <p:style>
+          <a:lnRef idx="2">
+            <a:schemeClr val="accent1">
+              <a:shade val="50000"/>
+            </a:schemeClr>
+          </a:lnRef>
+          <a:fillRef idx="1">
+            <a:schemeClr val="accent1"/>
+          </a:fillRef>
+          <a:effectRef idx="0">
+            <a:schemeClr val="accent1"/>
+          </a:effectRef>
+          <a:fontRef idx="minor">
+            <a:schemeClr val="lt1"/>
+          </a:fontRef>
+        </p:style>
+        <p:txBody>
+          <a:bodyPr rtlCol="0" anchor="ctr"/>
+          <a:lstStyle/>
+          <a:p>
+            <a:pPr algn="ctr"/>
+            <a:r>
+              <a:rPr lang="en-US" dirty="0"/>
               <a:t>Modify .csv files </a:t>
             </a:r>
           </a:p>
           <a:p>
             <a:pPr algn="ctr"/>
             <a:r>
-              <a:rPr lang="en-US" sz="1200" dirty="0" smtClean="0"/>
+              <a:rPr lang="en-US" sz="1200" dirty="0"/>
               <a:t>Documents&gt;GitHub&gt;</a:t>
             </a:r>
             <a:r>
-              <a:rPr lang="en-US" sz="1200" dirty="0" err="1" smtClean="0"/>
+              <a:rPr lang="en-US" sz="1200" dirty="0" err="1"/>
               <a:t>TerikoTableau</a:t>
             </a:r>
             <a:r>
-              <a:rPr lang="en-US" sz="1200" dirty="0" smtClean="0"/>
+              <a:rPr lang="en-US" sz="1200" dirty="0"/>
+              <a:t>&gt;Prep Flows</a:t>
+            </a:r>
+          </a:p>
+        </p:txBody>
+      </p:sp>
+      <p:sp>
+        <p:nvSpPr>
+          <p:cNvPr id="17" name="Flowchart: Decision 16"/>
+          <p:cNvSpPr/>
+          <p:nvPr/>
+        </p:nvSpPr>
+        <p:spPr>
+          <a:xfrm>
+            <a:off x="8386176" y="1132223"/>
+            <a:ext cx="1752600" cy="1522814"/>
+          </a:xfrm>
+          <a:prstGeom prst="flowChartDecision">
+            <a:avLst/>
+          </a:prstGeom>
+        </p:spPr>
+        <p:style>
+          <a:lnRef idx="2">
+            <a:schemeClr val="accent1">
+              <a:shade val="50000"/>
+            </a:schemeClr>
+          </a:lnRef>
+          <a:fillRef idx="1">
+            <a:schemeClr val="accent1"/>
+          </a:fillRef>
+          <a:effectRef idx="0">
+            <a:schemeClr val="accent1"/>
+          </a:effectRef>
+          <a:fontRef idx="minor">
+            <a:schemeClr val="lt1"/>
+          </a:fontRef>
+        </p:style>
+        <p:txBody>
+          <a:bodyPr rtlCol="0" anchor="ctr"/>
+          <a:lstStyle/>
+          <a:p>
+            <a:pPr algn="ctr"/>
+            <a:r>
+              <a:rPr lang="en-US" sz="1400" b="1" dirty="0"/>
+              <a:t>Update</a:t>
+            </a:r>
+            <a:r>
+              <a:rPr lang="en-US" sz="1400" dirty="0"/>
+              <a:t> </a:t>
+            </a:r>
+            <a:r>
+              <a:rPr lang="en-US" sz="1400" b="1" dirty="0"/>
+              <a:t>mapping?</a:t>
+            </a:r>
+          </a:p>
+        </p:txBody>
+      </p:sp>
+      <p:sp>
+        <p:nvSpPr>
+          <p:cNvPr id="18" name="Flowchart: Process 17"/>
+          <p:cNvSpPr/>
+          <p:nvPr/>
+        </p:nvSpPr>
+        <p:spPr>
+          <a:xfrm>
+            <a:off x="11201400" y="3852164"/>
+            <a:ext cx="2362200" cy="810768"/>
+          </a:xfrm>
+          <a:prstGeom prst="flowChartProcess">
+            <a:avLst/>
+          </a:prstGeom>
+        </p:spPr>
+        <p:style>
+          <a:lnRef idx="2">
+            <a:schemeClr val="accent1">
+              <a:shade val="50000"/>
+            </a:schemeClr>
+          </a:lnRef>
+          <a:fillRef idx="1">
+            <a:schemeClr val="accent1"/>
+          </a:fillRef>
+          <a:effectRef idx="0">
+            <a:schemeClr val="accent1"/>
+          </a:effectRef>
+          <a:fontRef idx="minor">
+            <a:schemeClr val="lt1"/>
+          </a:fontRef>
+        </p:style>
+        <p:txBody>
+          <a:bodyPr rtlCol="0" anchor="ctr"/>
+          <a:lstStyle/>
+          <a:p>
+            <a:pPr algn="ctr"/>
+            <a:r>
+              <a:rPr lang="en-US" dirty="0"/>
+              <a:t>Open these apps</a:t>
+            </a:r>
+          </a:p>
+          <a:p>
+            <a:pPr marL="285750" indent="-285750">
+              <a:buFont typeface="Arial" panose="020B0604020202020204" pitchFamily="34" charset="0"/>
+              <a:buChar char="•"/>
+            </a:pPr>
+            <a:r>
+              <a:rPr lang="en-US" dirty="0" err="1"/>
+              <a:t>Github</a:t>
+            </a:r>
+            <a:endParaRPr lang="en-US" dirty="0"/>
+          </a:p>
+          <a:p>
+            <a:pPr marL="285750" indent="-285750">
+              <a:buFont typeface="Arial" panose="020B0604020202020204" pitchFamily="34" charset="0"/>
+              <a:buChar char="•"/>
+            </a:pPr>
+            <a:r>
+              <a:rPr lang="en-US" dirty="0"/>
+              <a:t>Tableau Prep </a:t>
+            </a:r>
+            <a:r>
+              <a:rPr lang="en-US" dirty="0" err="1"/>
+              <a:t>Buider</a:t>
+            </a:r>
+            <a:endParaRPr lang="en-US" dirty="0"/>
+          </a:p>
+        </p:txBody>
+      </p:sp>
+      <p:cxnSp>
+        <p:nvCxnSpPr>
+          <p:cNvPr id="20" name="Straight Arrow Connector 19"/>
+          <p:cNvCxnSpPr>
+            <a:stCxn id="17" idx="2"/>
+            <a:endCxn id="16" idx="0"/>
+          </p:cNvCxnSpPr>
+          <p:nvPr/>
+        </p:nvCxnSpPr>
+        <p:spPr>
+          <a:xfrm>
+            <a:off x="9262476" y="2655037"/>
+            <a:ext cx="0" cy="775123"/>
+          </a:xfrm>
+          <a:prstGeom prst="straightConnector1">
+            <a:avLst/>
+          </a:prstGeom>
+          <a:ln w="25400">
+            <a:tailEnd type="triangle" w="lg" len="lg"/>
+          </a:ln>
+        </p:spPr>
+        <p:style>
+          <a:lnRef idx="1">
+            <a:schemeClr val="accent1"/>
+          </a:lnRef>
+          <a:fillRef idx="0">
+            <a:schemeClr val="accent1"/>
+          </a:fillRef>
+          <a:effectRef idx="0">
+            <a:schemeClr val="accent1"/>
+          </a:effectRef>
+          <a:fontRef idx="minor">
+            <a:schemeClr val="tx1"/>
+          </a:fontRef>
+        </p:style>
+      </p:cxnSp>
+      <p:sp>
+        <p:nvSpPr>
+          <p:cNvPr id="21" name="TextBox 20"/>
+          <p:cNvSpPr txBox="1"/>
+          <p:nvPr/>
+        </p:nvSpPr>
+        <p:spPr>
+          <a:xfrm>
+            <a:off x="9037320" y="2754868"/>
+            <a:ext cx="420243" cy="307777"/>
+          </a:xfrm>
+          <a:prstGeom prst="rect">
+            <a:avLst/>
+          </a:prstGeom>
+          <a:solidFill>
+            <a:schemeClr val="bg1"/>
+          </a:solidFill>
+        </p:spPr>
+        <p:txBody>
+          <a:bodyPr wrap="none" rtlCol="0">
+            <a:spAutoFit/>
+          </a:bodyPr>
+          <a:lstStyle/>
+          <a:p>
+            <a:r>
+              <a:rPr lang="en-US" sz="1400" dirty="0"/>
+              <a:t>Yes</a:t>
+            </a:r>
+          </a:p>
+        </p:txBody>
+      </p:sp>
+      <p:cxnSp>
+        <p:nvCxnSpPr>
+          <p:cNvPr id="26" name="Straight Arrow Connector 25"/>
+          <p:cNvCxnSpPr>
+            <a:stCxn id="17" idx="3"/>
+          </p:cNvCxnSpPr>
+          <p:nvPr/>
+        </p:nvCxnSpPr>
+        <p:spPr>
+          <a:xfrm>
+            <a:off x="10138776" y="1893630"/>
+            <a:ext cx="1062624" cy="0"/>
+          </a:xfrm>
+          <a:prstGeom prst="straightConnector1">
+            <a:avLst/>
+          </a:prstGeom>
+          <a:ln w="25400">
+            <a:tailEnd type="triangle" w="lg" len="lg"/>
+          </a:ln>
+        </p:spPr>
+        <p:style>
+          <a:lnRef idx="1">
+            <a:schemeClr val="accent1"/>
+          </a:lnRef>
+          <a:fillRef idx="0">
+            <a:schemeClr val="accent1"/>
+          </a:fillRef>
+          <a:effectRef idx="0">
+            <a:schemeClr val="accent1"/>
+          </a:effectRef>
+          <a:fontRef idx="minor">
+            <a:schemeClr val="tx1"/>
+          </a:fontRef>
+        </p:style>
+      </p:cxnSp>
+      <p:sp>
+        <p:nvSpPr>
+          <p:cNvPr id="23" name="TextBox 22"/>
+          <p:cNvSpPr txBox="1"/>
+          <p:nvPr/>
+        </p:nvSpPr>
+        <p:spPr>
+          <a:xfrm>
+            <a:off x="10445202" y="1708802"/>
+            <a:ext cx="394660" cy="307777"/>
+          </a:xfrm>
+          <a:prstGeom prst="rect">
+            <a:avLst/>
+          </a:prstGeom>
+          <a:solidFill>
+            <a:schemeClr val="bg1"/>
+          </a:solidFill>
+        </p:spPr>
+        <p:txBody>
+          <a:bodyPr wrap="none" rtlCol="0">
+            <a:spAutoFit/>
+          </a:bodyPr>
+          <a:lstStyle/>
+          <a:p>
+            <a:r>
+              <a:rPr lang="en-US" sz="1400" dirty="0"/>
+              <a:t>No</a:t>
+            </a:r>
+          </a:p>
+        </p:txBody>
+      </p:sp>
+      <p:cxnSp>
+        <p:nvCxnSpPr>
+          <p:cNvPr id="31" name="Straight Arrow Connector 30"/>
+          <p:cNvCxnSpPr>
+            <a:stCxn id="15" idx="3"/>
+            <a:endCxn id="17" idx="1"/>
+          </p:cNvCxnSpPr>
+          <p:nvPr/>
+        </p:nvCxnSpPr>
+        <p:spPr>
+          <a:xfrm flipV="1">
+            <a:off x="7924800" y="1893630"/>
+            <a:ext cx="461376" cy="4572"/>
+          </a:xfrm>
+          <a:prstGeom prst="straightConnector1">
+            <a:avLst/>
+          </a:prstGeom>
+          <a:ln w="25400">
+            <a:tailEnd type="triangle" w="lg" len="lg"/>
+          </a:ln>
+        </p:spPr>
+        <p:style>
+          <a:lnRef idx="1">
+            <a:schemeClr val="accent1"/>
+          </a:lnRef>
+          <a:fillRef idx="0">
+            <a:schemeClr val="accent1"/>
+          </a:fillRef>
+          <a:effectRef idx="0">
+            <a:schemeClr val="accent1"/>
+          </a:effectRef>
+          <a:fontRef idx="minor">
+            <a:schemeClr val="tx1"/>
+          </a:fontRef>
+        </p:style>
+      </p:cxnSp>
+      <p:sp>
+        <p:nvSpPr>
+          <p:cNvPr id="52" name="Flowchart: Process 51"/>
+          <p:cNvSpPr/>
+          <p:nvPr/>
+        </p:nvSpPr>
+        <p:spPr>
+          <a:xfrm>
+            <a:off x="7660188" y="4336595"/>
+            <a:ext cx="3204576" cy="581466"/>
+          </a:xfrm>
+          <a:prstGeom prst="flowChartProcess">
+            <a:avLst/>
+          </a:prstGeom>
+        </p:spPr>
+        <p:style>
+          <a:lnRef idx="2">
+            <a:schemeClr val="accent1">
+              <a:shade val="50000"/>
+            </a:schemeClr>
+          </a:lnRef>
+          <a:fillRef idx="1">
+            <a:schemeClr val="accent1"/>
+          </a:fillRef>
+          <a:effectRef idx="0">
+            <a:schemeClr val="accent1"/>
+          </a:effectRef>
+          <a:fontRef idx="minor">
+            <a:schemeClr val="lt1"/>
+          </a:fontRef>
+        </p:style>
+        <p:txBody>
+          <a:bodyPr rtlCol="0" anchor="ctr"/>
+          <a:lstStyle/>
+          <a:p>
+            <a:pPr algn="ctr"/>
+            <a:r>
+              <a:rPr lang="en-US" dirty="0"/>
+              <a:t>Modify .csv files </a:t>
+            </a:r>
+          </a:p>
+          <a:p>
+            <a:pPr algn="ctr"/>
+            <a:r>
+              <a:rPr lang="en-US" sz="1200" dirty="0"/>
+              <a:t>Documents&gt;GitHub&gt;</a:t>
+            </a:r>
+            <a:r>
+              <a:rPr lang="en-US" sz="1200" dirty="0" err="1"/>
+              <a:t>TerikoTableau</a:t>
+            </a:r>
+            <a:r>
+              <a:rPr lang="en-US" sz="1200" dirty="0"/>
               <a:t>&gt;Prep Flows</a:t>
             </a:r>
           </a:p>
@@ -5100,13 +5450,6 @@
   <p:clrMapOvr>
     <a:masterClrMapping/>
   </p:clrMapOvr>
-  <p:timing>
-    <p:tnLst>
-      <p:par>
-        <p:cTn id="1" dur="indefinite" restart="never" nodeType="tmRoot"/>
-      </p:par>
-    </p:tnLst>
-  </p:timing>
 </p:sld>
 </file>
 

</xml_diff>